<commit_message>
Include data sources and assets; retain .xlsx as primary inputs; add sanitize script and favicons
</commit_message>
<xml_diff>
--- a/Pre_Primary_Feedback_Analysis.pptx
+++ b/Pre_Primary_Feedback_Analysis.pptx
@@ -180,22 +180,22 @@
                 <c:formatCode>General</c:formatCode>
                 <c:ptCount val="6"/>
                 <c:pt idx="0">
-                  <c:v>4.540899898887766</c:v>
+                  <c:v>4.323367263940507</c:v>
                 </c:pt>
                 <c:pt idx="1">
-                  <c:v>4.5616675017438375</c:v>
+                  <c:v>4.33689124013398</c:v>
                 </c:pt>
                 <c:pt idx="2">
-                  <c:v>4.658611894213988</c:v>
+                  <c:v>4.425840422814704</c:v>
                 </c:pt>
                 <c:pt idx="3">
-                  <c:v>4.3793191056910565</c:v>
+                  <c:v>3.9971569086955956</c:v>
                 </c:pt>
                 <c:pt idx="4">
-                  <c:v>4.565862323212011</c:v>
+                  <c:v>4.429226823445013</c:v>
                 </c:pt>
                 <c:pt idx="5">
-                  <c:v>4.129690585911784</c:v>
+                  <c:v>3.8842192797287787</c:v>
                 </c:pt>
               </c:numCache>
             </c:numRef>
@@ -309,16 +309,16 @@
                 <c:formatCode>General</c:formatCode>
                 <c:ptCount val="4"/>
                 <c:pt idx="0">
-                  <c:v>4.623455451983525</c:v>
+                  <c:v>4.407635723166183</c:v>
                 </c:pt>
                 <c:pt idx="1">
-                  <c:v>4.6123386567490705</c:v>
+                  <c:v>4.425470711297071</c:v>
                 </c:pt>
                 <c:pt idx="2">
-                  <c:v>4.335782512858192</c:v>
+                  <c:v>4.247917687408133</c:v>
                 </c:pt>
                 <c:pt idx="3">
-                  <c:v>4.705856832971801</c:v>
+                  <c:v>4.398358356278248</c:v>
                 </c:pt>
               </c:numCache>
             </c:numRef>
@@ -441,25 +441,25 @@
                 <c:formatCode>General</c:formatCode>
                 <c:ptCount val="7"/>
                 <c:pt idx="0">
-                  <c:v>4.623455451983525</c:v>
+                  <c:v>4.407635723166183</c:v>
                 </c:pt>
                 <c:pt idx="1">
-                  <c:v>4.6123386567490705</c:v>
+                  <c:v>4.425470711297071</c:v>
                 </c:pt>
                 <c:pt idx="2">
-                  <c:v>4.584098737083812</c:v>
+                  <c:v>4.462504663599055</c:v>
                 </c:pt>
                 <c:pt idx="3">
-                  <c:v>4.534272300469484</c:v>
+                  <c:v>4.36720052177694</c:v>
                 </c:pt>
                 <c:pt idx="4">
-                  <c:v>4.56269637246501</c:v>
+                  <c:v>4.4356188704768345</c:v>
                 </c:pt>
                 <c:pt idx="5">
-                  <c:v>4.47082878953108</c:v>
+                  <c:v>4.307357669756005</c:v>
                 </c:pt>
                 <c:pt idx="6">
-                  <c:v>4.434920634920635</c:v>
+                  <c:v>4.136848163347012</c:v>
                 </c:pt>
               </c:numCache>
             </c:numRef>
@@ -566,10 +566,10 @@
                 <c:formatCode>General</c:formatCode>
                 <c:ptCount val="4"/>
                 <c:pt idx="0">
-                  <c:v>3049</c:v>
+                  <c:v>31966</c:v>
                 </c:pt>
                 <c:pt idx="1">
-                  <c:v>1815</c:v>
+                  <c:v>19178</c:v>
                 </c:pt>
                 <c:pt idx="2">
                   <c:v>0</c:v>
@@ -636,10 +636,10 @@
               <c:strCache>
                 <c:ptCount val="4"/>
                 <c:pt idx="0">
+                  <c:v>The school offers adequat</c:v>
+                </c:pt>
+                <c:pt idx="1">
                   <c:v>The safety measures imple</c:v>
-                </c:pt>
-                <c:pt idx="1">
-                  <c:v>The school offers adequat</c:v>
                 </c:pt>
                 <c:pt idx="2">
                   <c:v>Campus hygiene and genera</c:v>
@@ -657,16 +657,16 @@
                 <c:formatCode>General</c:formatCode>
                 <c:ptCount val="4"/>
                 <c:pt idx="0">
-                  <c:v>4.468954962833406</c:v>
+                  <c:v>4.177346698591778</c:v>
                 </c:pt>
                 <c:pt idx="1">
-                  <c:v>4.459636517328825</c:v>
+                  <c:v>4.133281127642913</c:v>
                 </c:pt>
                 <c:pt idx="2">
-                  <c:v>4.424209614551754</c:v>
+                  <c:v>3.9723413198823034</c:v>
                 </c:pt>
                 <c:pt idx="3">
-                  <c:v>4.000671140939597</c:v>
+                  <c:v>3.5242068684441965</c:v>
                 </c:pt>
               </c:numCache>
             </c:numRef>
@@ -773,13 +773,13 @@
                 <c:formatCode>General</c:formatCode>
                 <c:ptCount val="4"/>
                 <c:pt idx="0">
-                  <c:v>4190</c:v>
+                  <c:v>37681</c:v>
                 </c:pt>
                 <c:pt idx="1">
-                  <c:v>107</c:v>
+                  <c:v>2510</c:v>
                 </c:pt>
                 <c:pt idx="2">
-                  <c:v>619</c:v>
+                  <c:v>11113</c:v>
                 </c:pt>
                 <c:pt idx="3">
                   <c:v>0</c:v>
@@ -843,34 +843,34 @@
               <c:strCache>
                 <c:ptCount val="10"/>
                 <c:pt idx="0">
-                  <c:v>Roya puram</c:v>
+                  <c:v>Salem 2</c:v>
                 </c:pt>
                 <c:pt idx="1">
-                  <c:v>Sri chaitanya techno scho</c:v>
+                  <c:v>Coimbatore 4</c:v>
                 </c:pt>
                 <c:pt idx="2">
-                  <c:v>Chetty Street, coimbatore</c:v>
+                  <c:v>Hosur 3</c:v>
                 </c:pt>
                 <c:pt idx="3">
-                  <c:v>Sri Chaitanya school , se</c:v>
+                  <c:v>Coimbatore Chetty Street</c:v>
                 </c:pt>
                 <c:pt idx="4">
-                  <c:v>Sri Chaitanya techno scho</c:v>
+                  <c:v>Vellore</c:v>
                 </c:pt>
                 <c:pt idx="5">
-                  <c:v>K k nagar</c:v>
+                  <c:v>Valasaravakkam</c:v>
                 </c:pt>
                 <c:pt idx="6">
-                  <c:v>Gandhipuram -4 Coimbatore</c:v>
+                  <c:v>Madurai</c:v>
                 </c:pt>
                 <c:pt idx="7">
-                  <c:v>Hosur3</c:v>
+                  <c:v>Thanjavur</c:v>
                 </c:pt>
                 <c:pt idx="8">
-                  <c:v>COIMBATORE-1</c:v>
+                  <c:v>Tiruppur 2</c:v>
                 </c:pt>
                 <c:pt idx="9">
-                  <c:v>Tambaram mudichur branch</c:v>
+                  <c:v>Coimbatore 6</c:v>
                 </c:pt>
               </c:strCache>
             </c:strRef>
@@ -882,34 +882,34 @@
                 <c:formatCode>General</c:formatCode>
                 <c:ptCount val="10"/>
                 <c:pt idx="0">
-                  <c:v>5.0</c:v>
+                  <c:v>4.593598650952997</c:v>
                 </c:pt>
                 <c:pt idx="1">
-                  <c:v>5.0</c:v>
+                  <c:v>4.571191433495361</c:v>
                 </c:pt>
                 <c:pt idx="2">
-                  <c:v>5.0</c:v>
+                  <c:v>4.550690041383702</c:v>
                 </c:pt>
                 <c:pt idx="3">
-                  <c:v>5.0</c:v>
+                  <c:v>4.550642875853887</c:v>
                 </c:pt>
                 <c:pt idx="4">
-                  <c:v>5.0</c:v>
+                  <c:v>4.520580218960462</c:v>
                 </c:pt>
                 <c:pt idx="5">
-                  <c:v>5.0</c:v>
+                  <c:v>4.478479232305133</c:v>
                 </c:pt>
                 <c:pt idx="6">
-                  <c:v>5.0</c:v>
+                  <c:v>4.429532929215926</c:v>
                 </c:pt>
                 <c:pt idx="7">
-                  <c:v>5.0</c:v>
+                  <c:v>4.424231541503598</c:v>
                 </c:pt>
                 <c:pt idx="8">
-                  <c:v>5.0</c:v>
+                  <c:v>4.420640104699313</c:v>
                 </c:pt>
                 <c:pt idx="9">
-                  <c:v>5.0</c:v>
+                  <c:v>4.417793770155797</c:v>
                 </c:pt>
               </c:numCache>
             </c:numRef>
@@ -1002,34 +1002,34 @@
               <c:strCache>
                 <c:ptCount val="10"/>
                 <c:pt idx="0">
-                  <c:v>Roya puram</c:v>
+                  <c:v>Salem 2</c:v>
                 </c:pt>
                 <c:pt idx="1">
-                  <c:v>Sri chaitanya techno scho</c:v>
+                  <c:v>Coimbatore 4</c:v>
                 </c:pt>
                 <c:pt idx="2">
-                  <c:v>Chetty Street, coimbatore</c:v>
+                  <c:v>Hosur 3</c:v>
                 </c:pt>
                 <c:pt idx="3">
-                  <c:v>Sri Chaitanya school , se</c:v>
+                  <c:v>Coimbatore Chetty Street</c:v>
                 </c:pt>
                 <c:pt idx="4">
-                  <c:v>Sri Chaitanya techno scho</c:v>
+                  <c:v>Vellore</c:v>
                 </c:pt>
                 <c:pt idx="5">
-                  <c:v>K k nagar</c:v>
+                  <c:v>Valasaravakkam</c:v>
                 </c:pt>
                 <c:pt idx="6">
-                  <c:v>Gandhipuram -4 Coimbatore</c:v>
+                  <c:v>Madurai</c:v>
                 </c:pt>
                 <c:pt idx="7">
-                  <c:v>Hosur3</c:v>
+                  <c:v>Thanjavur</c:v>
                 </c:pt>
                 <c:pt idx="8">
-                  <c:v>COIMBATORE-1</c:v>
+                  <c:v>Tiruppur 2</c:v>
                 </c:pt>
                 <c:pt idx="9">
-                  <c:v>Tambaram mudichur branch</c:v>
+                  <c:v>Coimbatore 6</c:v>
                 </c:pt>
               </c:strCache>
             </c:strRef>
@@ -1041,34 +1041,34 @@
                 <c:formatCode>General</c:formatCode>
                 <c:ptCount val="10"/>
                 <c:pt idx="0">
-                  <c:v>5.0</c:v>
+                  <c:v>4.593598650952997</c:v>
                 </c:pt>
                 <c:pt idx="1">
-                  <c:v>5.0</c:v>
+                  <c:v>4.571191433495361</c:v>
                 </c:pt>
                 <c:pt idx="2">
-                  <c:v>5.0</c:v>
+                  <c:v>4.550690041383702</c:v>
                 </c:pt>
                 <c:pt idx="3">
-                  <c:v>5.0</c:v>
+                  <c:v>4.550642875853887</c:v>
                 </c:pt>
                 <c:pt idx="4">
-                  <c:v>5.0</c:v>
+                  <c:v>4.520580218960462</c:v>
                 </c:pt>
                 <c:pt idx="5">
-                  <c:v>5.0</c:v>
+                  <c:v>4.478479232305133</c:v>
                 </c:pt>
                 <c:pt idx="6">
-                  <c:v>5.0</c:v>
+                  <c:v>4.429532929215926</c:v>
                 </c:pt>
                 <c:pt idx="7">
-                  <c:v>5.0</c:v>
+                  <c:v>4.424231541503598</c:v>
                 </c:pt>
                 <c:pt idx="8">
-                  <c:v>5.0</c:v>
+                  <c:v>4.420640104699313</c:v>
                 </c:pt>
                 <c:pt idx="9">
-                  <c:v>5.0</c:v>
+                  <c:v>4.417793770155797</c:v>
                 </c:pt>
               </c:numCache>
             </c:numRef>
@@ -1161,49 +1161,49 @@
               <c:strCache>
                 <c:ptCount val="15"/>
                 <c:pt idx="0">
-                  <c:v>3rd Branch</c:v>
+                  <c:v>Valasaravakkam</c:v>
                 </c:pt>
                 <c:pt idx="1">
-                  <c:v>Athipalayam</c:v>
+                  <c:v>Salem 2</c:v>
                 </c:pt>
                 <c:pt idx="2">
-                  <c:v>Bagalur</c:v>
+                  <c:v>Hosur 3</c:v>
                 </c:pt>
                 <c:pt idx="3">
-                  <c:v>Branch -3</c:v>
+                  <c:v>Vellore</c:v>
                 </c:pt>
                 <c:pt idx="4">
-                  <c:v>Branch 3</c:v>
+                  <c:v>Coimbatore Chetty Street</c:v>
                 </c:pt>
                 <c:pt idx="5">
-                  <c:v>CBE - 1</c:v>
+                  <c:v>Coimbatore 4</c:v>
                 </c:pt>
                 <c:pt idx="6">
-                  <c:v>CBE 1</c:v>
+                  <c:v>Salem Yercaud Foothills</c:v>
                 </c:pt>
                 <c:pt idx="7">
-                  <c:v>CBE 4 GANDHUPURAM</c:v>
+                  <c:v>Madurai</c:v>
                 </c:pt>
                 <c:pt idx="8">
-                  <c:v>CBE 4 Gandhipuram</c:v>
+                  <c:v>Coimbatore Kalapatti</c:v>
                 </c:pt>
                 <c:pt idx="9">
-                  <c:v>CBE-4; Nanjappa Road, Gan</c:v>
+                  <c:v>Padur</c:v>
                 </c:pt>
                 <c:pt idx="10">
-                  <c:v>CBE-6</c:v>
+                  <c:v>Coimbatore 6</c:v>
                 </c:pt>
                 <c:pt idx="11">
-                  <c:v>CBE1</c:v>
+                  <c:v>Thoraipakkam</c:v>
                 </c:pt>
                 <c:pt idx="12">
-                  <c:v>CHETTY STREET</c:v>
+                  <c:v>Pollachi</c:v>
                 </c:pt>
                 <c:pt idx="13">
-                  <c:v>CHINNAVEDAMPATTI</c:v>
+                  <c:v>Moolakadai</c:v>
                 </c:pt>
                 <c:pt idx="14">
-                  <c:v>CHITHANAPALLI,HOSUR</c:v>
+                  <c:v>Coimbatore 2</c:v>
                 </c:pt>
               </c:strCache>
             </c:strRef>
@@ -1215,49 +1215,49 @@
                 <c:formatCode>General</c:formatCode>
                 <c:ptCount val="15"/>
                 <c:pt idx="0">
-                  <c:v>100.0</c:v>
+                  <c:v>86.53846153846155</c:v>
                 </c:pt>
                 <c:pt idx="1">
-                  <c:v>100.0</c:v>
+                  <c:v>86.51315789473685</c:v>
                 </c:pt>
                 <c:pt idx="2">
-                  <c:v>100.0</c:v>
+                  <c:v>85.76429404900817</c:v>
                 </c:pt>
                 <c:pt idx="3">
-                  <c:v>100.0</c:v>
+                  <c:v>85.18164435946463</c:v>
                 </c:pt>
                 <c:pt idx="4">
-                  <c:v>100.0</c:v>
+                  <c:v>84.4769403824522</c:v>
                 </c:pt>
                 <c:pt idx="5">
-                  <c:v>100.0</c:v>
+                  <c:v>83.10344827586206</c:v>
                 </c:pt>
                 <c:pt idx="6">
-                  <c:v>100.0</c:v>
+                  <c:v>81.84523809523809</c:v>
                 </c:pt>
                 <c:pt idx="7">
-                  <c:v>100.0</c:v>
+                  <c:v>80.66825775656325</c:v>
                 </c:pt>
                 <c:pt idx="8">
-                  <c:v>100.0</c:v>
+                  <c:v>80.36649214659685</c:v>
                 </c:pt>
                 <c:pt idx="9">
-                  <c:v>100.0</c:v>
+                  <c:v>80.0</c:v>
                 </c:pt>
                 <c:pt idx="10">
-                  <c:v>100.0</c:v>
+                  <c:v>79.22661870503596</c:v>
                 </c:pt>
                 <c:pt idx="11">
-                  <c:v>100.0</c:v>
+                  <c:v>78.56093979441997</c:v>
                 </c:pt>
                 <c:pt idx="12">
-                  <c:v>100.0</c:v>
+                  <c:v>78.06451612903226</c:v>
                 </c:pt>
                 <c:pt idx="13">
-                  <c:v>100.0</c:v>
+                  <c:v>77.55511022044088</c:v>
                 </c:pt>
                 <c:pt idx="14">
-                  <c:v>100.0</c:v>
+                  <c:v>77.22122838401908</c:v>
                 </c:pt>
               </c:numCache>
             </c:numRef>
@@ -1344,1608 +1344,306 @@
           </c:spPr>
           <c:xVal>
             <c:numRef>
-              <c:f>Sheet1!$A$2:$A$266</c:f>
+              <c:f>Sheet1!$A$2:$A$49</c:f>
               <c:numCache>
                 <c:formatCode>General</c:formatCode>
-                <c:ptCount val="265"/>
+                <c:ptCount val="48"/>
                 <c:pt idx="0">
-                  <c:v>4.387052341597795</c:v>
+                  <c:v>4.3149211666799605</c:v>
                 </c:pt>
                 <c:pt idx="1">
-                  <c:v>4.683333333333334</c:v>
+                  <c:v>4.361278489134377</c:v>
                 </c:pt>
                 <c:pt idx="2">
-                  <c:v>5.0</c:v>
+                  <c:v>4.5343392655822194</c:v>
                 </c:pt>
                 <c:pt idx="3">
-                  <c:v>4.5</c:v>
+                  <c:v>4.344600909052291</c:v>
                 </c:pt>
                 <c:pt idx="4">
-                  <c:v>4.0</c:v>
+                  <c:v>4.449302589252755</c:v>
                 </c:pt>
                 <c:pt idx="5">
-                  <c:v>4.5</c:v>
+                  <c:v>4.231185481185481</c:v>
                 </c:pt>
                 <c:pt idx="6">
-                  <c:v>4.57051282051282</c:v>
+                  <c:v>4.28173585020923</c:v>
                 </c:pt>
                 <c:pt idx="7">
-                  <c:v>4.533333333333333</c:v>
+                  <c:v>4.3378025194710155</c:v>
                 </c:pt>
                 <c:pt idx="8">
-                  <c:v>4.0</c:v>
+                  <c:v>4.3964744801512285</c:v>
                 </c:pt>
                 <c:pt idx="9">
-                  <c:v>4.25</c:v>
+                  <c:v>4.513137706175681</c:v>
                 </c:pt>
                 <c:pt idx="10">
-                  <c:v>4.7</c:v>
+                  <c:v>4.220191600709312</c:v>
                 </c:pt>
                 <c:pt idx="11">
-                  <c:v>4.0</c:v>
+                  <c:v>4.301421441939222</c:v>
                 </c:pt>
                 <c:pt idx="12">
-                  <c:v>4.453551912568305</c:v>
+                  <c:v>4.225795361247948</c:v>
                 </c:pt>
                 <c:pt idx="13">
-                  <c:v>4.491358024691358</c:v>
+                  <c:v>4.358082880974448</c:v>
                 </c:pt>
                 <c:pt idx="14">
-                  <c:v>5.0</c:v>
+                  <c:v>4.279690013159819</c:v>
                 </c:pt>
                 <c:pt idx="15">
-                  <c:v>5.0</c:v>
+                  <c:v>4.195614035087719</c:v>
                 </c:pt>
                 <c:pt idx="16">
-                  <c:v>4.125</c:v>
+                  <c:v>4.324172576832152</c:v>
                 </c:pt>
                 <c:pt idx="17">
-                  <c:v>4.59641873278237</c:v>
+                  <c:v>4.325853843410023</c:v>
                 </c:pt>
                 <c:pt idx="18">
-                  <c:v>4.674603174603175</c:v>
+                  <c:v>4.359382366808109</c:v>
                 </c:pt>
                 <c:pt idx="19">
-                  <c:v>5.0</c:v>
+                  <c:v>4.289209726443769</c:v>
                 </c:pt>
                 <c:pt idx="20">
-                  <c:v>4.488095238095238</c:v>
+                  <c:v>4.219739128392974</c:v>
                 </c:pt>
                 <c:pt idx="21">
-                  <c:v>4.460526315789473</c:v>
+                  <c:v>4.367681225356384</c:v>
                 </c:pt>
                 <c:pt idx="22">
-                  <c:v>4.125</c:v>
+                  <c:v>4.294391687310762</c:v>
                 </c:pt>
                 <c:pt idx="23">
-                  <c:v>5.0</c:v>
+                  <c:v>4.253773731714908</c:v>
                 </c:pt>
                 <c:pt idx="24">
-                  <c:v>4.5</c:v>
+                  <c:v>4.331427845528455</c:v>
                 </c:pt>
                 <c:pt idx="25">
-                  <c:v>4.666666666666667</c:v>
+                  <c:v>4.225856999426276</c:v>
                 </c:pt>
                 <c:pt idx="26">
-                  <c:v>4.0</c:v>
+                  <c:v>4.294804355850868</c:v>
                 </c:pt>
                 <c:pt idx="27">
-                  <c:v>4.0</c:v>
+                  <c:v>4.180439725439726</c:v>
                 </c:pt>
                 <c:pt idx="28">
-                  <c:v>4.5</c:v>
+                  <c:v>4.301171377641966</c:v>
                 </c:pt>
                 <c:pt idx="29">
-                  <c:v>5.0</c:v>
+                  <c:v>4.412705409619767</c:v>
                 </c:pt>
                 <c:pt idx="30">
-                  <c:v>4.416666666666667</c:v>
+                  <c:v>4.390756718528996</c:v>
                 </c:pt>
                 <c:pt idx="31">
-                  <c:v>5.0</c:v>
+                  <c:v>4.274594629237966</c:v>
                 </c:pt>
                 <c:pt idx="32">
-                  <c:v>3.75</c:v>
+                  <c:v>4.2811936228235785</c:v>
                 </c:pt>
                 <c:pt idx="33">
-                  <c:v>5.0</c:v>
+                  <c:v>4.549302944862156</c:v>
                 </c:pt>
                 <c:pt idx="34">
-                  <c:v>5.0</c:v>
+                  <c:v>4.383182328978789</c:v>
                 </c:pt>
                 <c:pt idx="35">
-                  <c:v>5.0</c:v>
+                  <c:v>4.221984805318139</c:v>
                 </c:pt>
                 <c:pt idx="36">
-                  <c:v>4.75</c:v>
+                  <c:v>4.373657521616706</c:v>
                 </c:pt>
                 <c:pt idx="37">
-                  <c:v>4.65</c:v>
+                  <c:v>4.361560302086937</c:v>
                 </c:pt>
                 <c:pt idx="38">
-                  <c:v>5.0</c:v>
+                  <c:v>4.274744784731469</c:v>
                 </c:pt>
                 <c:pt idx="39">
-                  <c:v>4.0</c:v>
+                  <c:v>4.292088760250844</c:v>
                 </c:pt>
                 <c:pt idx="40">
-                  <c:v>3.5</c:v>
+                  <c:v>4.115274983232729</c:v>
                 </c:pt>
                 <c:pt idx="41">
-                  <c:v>4.625</c:v>
+                  <c:v>4.361571198527721</c:v>
                 </c:pt>
                 <c:pt idx="42">
-                  <c:v>4.5</c:v>
+                  <c:v>4.336230188952961</c:v>
                 </c:pt>
                 <c:pt idx="43">
-                  <c:v>5.0</c:v>
+                  <c:v>4.335554430949167</c:v>
                 </c:pt>
                 <c:pt idx="44">
-                  <c:v>4.333333333333333</c:v>
+                  <c:v>4.447115384615384</c:v>
                 </c:pt>
                 <c:pt idx="45">
-                  <c:v>5.0</c:v>
+                  <c:v>4.20956670956671</c:v>
                 </c:pt>
                 <c:pt idx="46">
-                  <c:v>3.3333333333333335</c:v>
+                  <c:v>4.449965986394558</c:v>
                 </c:pt>
                 <c:pt idx="47">
-                  <c:v>4.470017636684304</c:v>
-                </c:pt>
-                <c:pt idx="48">
-                  <c:v>4.416666666666667</c:v>
-                </c:pt>
-                <c:pt idx="49">
-                  <c:v>3.625</c:v>
-                </c:pt>
-                <c:pt idx="50">
-                  <c:v>5.0</c:v>
-                </c:pt>
-                <c:pt idx="51">
-                  <c:v>5.0</c:v>
-                </c:pt>
-                <c:pt idx="52">
-                  <c:v>5.0</c:v>
-                </c:pt>
-                <c:pt idx="53">
-                  <c:v>5.0</c:v>
-                </c:pt>
-                <c:pt idx="54">
-                  <c:v>5.0</c:v>
-                </c:pt>
-                <c:pt idx="55">
-                  <c:v>4.75</c:v>
-                </c:pt>
-                <c:pt idx="56">
-                  <c:v>4.4833333333333325</c:v>
-                </c:pt>
-                <c:pt idx="57">
-                  <c:v>3.25</c:v>
-                </c:pt>
-                <c:pt idx="58">
-                  <c:v>0.0</c:v>
-                </c:pt>
-                <c:pt idx="59">
-                  <c:v>4.75</c:v>
-                </c:pt>
-                <c:pt idx="60">
-                  <c:v>4.45</c:v>
-                </c:pt>
-                <c:pt idx="61">
-                  <c:v>5.0</c:v>
-                </c:pt>
-                <c:pt idx="62">
-                  <c:v>5.0</c:v>
-                </c:pt>
-                <c:pt idx="63">
-                  <c:v>5.0</c:v>
-                </c:pt>
-                <c:pt idx="64">
-                  <c:v>4.404513888888888</c:v>
-                </c:pt>
-                <c:pt idx="65">
-                  <c:v>4.625</c:v>
-                </c:pt>
-                <c:pt idx="66">
-                  <c:v>4.407894736842105</c:v>
-                </c:pt>
-                <c:pt idx="67">
-                  <c:v>2.5</c:v>
-                </c:pt>
-                <c:pt idx="68">
-                  <c:v>4.0</c:v>
-                </c:pt>
-                <c:pt idx="69">
-                  <c:v>4.5036764705882355</c:v>
-                </c:pt>
-                <c:pt idx="70">
-                  <c:v>4.25</c:v>
-                </c:pt>
-                <c:pt idx="71">
-                  <c:v>5.0</c:v>
-                </c:pt>
-                <c:pt idx="72">
-                  <c:v>4.541889483065953</c:v>
-                </c:pt>
-                <c:pt idx="73">
-                  <c:v>5.0</c:v>
-                </c:pt>
-                <c:pt idx="74">
-                  <c:v>4.75</c:v>
-                </c:pt>
-                <c:pt idx="75">
-                  <c:v>5.0</c:v>
-                </c:pt>
-                <c:pt idx="76">
-                  <c:v>4.75</c:v>
-                </c:pt>
-                <c:pt idx="77">
-                  <c:v>4.664529914529914</c:v>
-                </c:pt>
-                <c:pt idx="78">
-                  <c:v>5.0</c:v>
-                </c:pt>
-                <c:pt idx="79">
-                  <c:v>5.0</c:v>
-                </c:pt>
-                <c:pt idx="80">
-                  <c:v>5.0</c:v>
-                </c:pt>
-                <c:pt idx="81">
-                  <c:v>5.0</c:v>
-                </c:pt>
-                <c:pt idx="82">
-                  <c:v>5.0</c:v>
-                </c:pt>
-                <c:pt idx="83">
-                  <c:v>4.521739130434782</c:v>
-                </c:pt>
-                <c:pt idx="84">
-                  <c:v>5.0</c:v>
-                </c:pt>
-                <c:pt idx="85">
-                  <c:v>5.0</c:v>
-                </c:pt>
-                <c:pt idx="86">
-                  <c:v>5.0</c:v>
-                </c:pt>
-                <c:pt idx="87">
-                  <c:v>4.0</c:v>
-                </c:pt>
-                <c:pt idx="88">
-                  <c:v>4.75</c:v>
-                </c:pt>
-                <c:pt idx="89">
-                  <c:v>0.0</c:v>
-                </c:pt>
-                <c:pt idx="90">
-                  <c:v>5.0</c:v>
-                </c:pt>
-                <c:pt idx="91">
-                  <c:v>4.5</c:v>
-                </c:pt>
-                <c:pt idx="92">
-                  <c:v>4.166666666666667</c:v>
-                </c:pt>
-                <c:pt idx="93">
-                  <c:v>4.75</c:v>
-                </c:pt>
-                <c:pt idx="94">
-                  <c:v>4.0</c:v>
-                </c:pt>
-                <c:pt idx="95">
-                  <c:v>4.25</c:v>
-                </c:pt>
-                <c:pt idx="96">
-                  <c:v>4.0</c:v>
-                </c:pt>
-                <c:pt idx="97">
-                  <c:v>4.733333333333333</c:v>
-                </c:pt>
-                <c:pt idx="98">
-                  <c:v>5.0</c:v>
-                </c:pt>
-                <c:pt idx="99">
-                  <c:v>4.25</c:v>
-                </c:pt>
-                <c:pt idx="100">
-                  <c:v>5.0</c:v>
-                </c:pt>
-                <c:pt idx="101">
-                  <c:v>4.0</c:v>
-                </c:pt>
-                <c:pt idx="102">
-                  <c:v>4.75</c:v>
-                </c:pt>
-                <c:pt idx="103">
-                  <c:v>4.5</c:v>
-                </c:pt>
-                <c:pt idx="104">
-                  <c:v>4.0</c:v>
-                </c:pt>
-                <c:pt idx="105">
-                  <c:v>5.0</c:v>
-                </c:pt>
-                <c:pt idx="106">
-                  <c:v>4.875</c:v>
-                </c:pt>
-                <c:pt idx="107">
-                  <c:v>4.25</c:v>
-                </c:pt>
-                <c:pt idx="108">
-                  <c:v>5.0</c:v>
-                </c:pt>
-                <c:pt idx="109">
-                  <c:v>5.0</c:v>
-                </c:pt>
-                <c:pt idx="110">
-                  <c:v>5.0</c:v>
-                </c:pt>
-                <c:pt idx="111">
-                  <c:v>5.0</c:v>
-                </c:pt>
-                <c:pt idx="112">
-                  <c:v>5.0</c:v>
-                </c:pt>
-                <c:pt idx="113">
-                  <c:v>4.75</c:v>
-                </c:pt>
-                <c:pt idx="114">
-                  <c:v>5.0</c:v>
-                </c:pt>
-                <c:pt idx="115">
-                  <c:v>4.25</c:v>
-                </c:pt>
-                <c:pt idx="116">
-                  <c:v>4.5</c:v>
-                </c:pt>
-                <c:pt idx="117">
-                  <c:v>4.75</c:v>
-                </c:pt>
-                <c:pt idx="118">
-                  <c:v>4.25</c:v>
-                </c:pt>
-                <c:pt idx="119">
-                  <c:v>5.0</c:v>
-                </c:pt>
-                <c:pt idx="120">
-                  <c:v>4.0</c:v>
-                </c:pt>
-                <c:pt idx="121">
-                  <c:v>3.0</c:v>
-                </c:pt>
-                <c:pt idx="122">
-                  <c:v>5.0</c:v>
-                </c:pt>
-                <c:pt idx="123">
-                  <c:v>5.0</c:v>
-                </c:pt>
-                <c:pt idx="124">
-                  <c:v>5.0</c:v>
-                </c:pt>
-                <c:pt idx="125">
-                  <c:v>4.25</c:v>
-                </c:pt>
-                <c:pt idx="126">
-                  <c:v>5.0</c:v>
-                </c:pt>
-                <c:pt idx="127">
-                  <c:v>5.0</c:v>
-                </c:pt>
-                <c:pt idx="128">
-                  <c:v>4.5</c:v>
-                </c:pt>
-                <c:pt idx="129">
-                  <c:v>4.875</c:v>
-                </c:pt>
-                <c:pt idx="130">
-                  <c:v>4.25</c:v>
-                </c:pt>
-                <c:pt idx="131">
-                  <c:v>5.0</c:v>
-                </c:pt>
-                <c:pt idx="132">
-                  <c:v>5.0</c:v>
-                </c:pt>
-                <c:pt idx="133">
-                  <c:v>3.75</c:v>
-                </c:pt>
-                <c:pt idx="134">
-                  <c:v>5.0</c:v>
-                </c:pt>
-                <c:pt idx="135">
-                  <c:v>4.0</c:v>
-                </c:pt>
-                <c:pt idx="136">
-                  <c:v>5.0</c:v>
-                </c:pt>
-                <c:pt idx="137">
-                  <c:v>3.75</c:v>
-                </c:pt>
-                <c:pt idx="138">
-                  <c:v>4.0</c:v>
-                </c:pt>
-                <c:pt idx="139">
-                  <c:v>5.0</c:v>
-                </c:pt>
-                <c:pt idx="140">
-                  <c:v>5.0</c:v>
-                </c:pt>
-                <c:pt idx="141">
-                  <c:v>5.0</c:v>
-                </c:pt>
-                <c:pt idx="142">
-                  <c:v>5.0</c:v>
-                </c:pt>
-                <c:pt idx="143">
-                  <c:v>4.229497354497355</c:v>
-                </c:pt>
-                <c:pt idx="144">
-                  <c:v>5.0</c:v>
-                </c:pt>
-                <c:pt idx="145">
-                  <c:v>4.0</c:v>
-                </c:pt>
-                <c:pt idx="146">
-                  <c:v>3.0</c:v>
-                </c:pt>
-                <c:pt idx="147">
-                  <c:v>4.0</c:v>
-                </c:pt>
-                <c:pt idx="148">
-                  <c:v>4.75</c:v>
-                </c:pt>
-                <c:pt idx="149">
-                  <c:v>5.0</c:v>
-                </c:pt>
-                <c:pt idx="150">
-                  <c:v>4.719534050179211</c:v>
-                </c:pt>
-                <c:pt idx="151">
-                  <c:v>5.0</c:v>
-                </c:pt>
-                <c:pt idx="152">
-                  <c:v>5.0</c:v>
-                </c:pt>
-                <c:pt idx="153">
-                  <c:v>4.5</c:v>
-                </c:pt>
-                <c:pt idx="154">
-                  <c:v>5.0</c:v>
-                </c:pt>
-                <c:pt idx="155">
-                  <c:v>4.0</c:v>
-                </c:pt>
-                <c:pt idx="156">
-                  <c:v>5.0</c:v>
-                </c:pt>
-                <c:pt idx="157">
-                  <c:v>5.0</c:v>
-                </c:pt>
-                <c:pt idx="158">
-                  <c:v>4.426375404530744</c:v>
-                </c:pt>
-                <c:pt idx="159">
-                  <c:v>4.0</c:v>
-                </c:pt>
-                <c:pt idx="160">
-                  <c:v>5.0</c:v>
-                </c:pt>
-                <c:pt idx="161">
-                  <c:v>5.0</c:v>
-                </c:pt>
-                <c:pt idx="162">
-                  <c:v>4.5</c:v>
-                </c:pt>
-                <c:pt idx="163">
-                  <c:v>3.6666666666666665</c:v>
-                </c:pt>
-                <c:pt idx="164">
-                  <c:v>5.0</c:v>
-                </c:pt>
-                <c:pt idx="165">
-                  <c:v>4.5</c:v>
-                </c:pt>
-                <c:pt idx="166">
-                  <c:v>5.0</c:v>
-                </c:pt>
-                <c:pt idx="167">
-                  <c:v>5.0</c:v>
-                </c:pt>
-                <c:pt idx="168">
-                  <c:v>5.0</c:v>
-                </c:pt>
-                <c:pt idx="169">
-                  <c:v>5.0</c:v>
-                </c:pt>
-                <c:pt idx="170">
-                  <c:v>4.75</c:v>
-                </c:pt>
-                <c:pt idx="171">
-                  <c:v>5.0</c:v>
-                </c:pt>
-                <c:pt idx="172">
-                  <c:v>5.0</c:v>
-                </c:pt>
-                <c:pt idx="173">
-                  <c:v>3.25</c:v>
-                </c:pt>
-                <c:pt idx="174">
-                  <c:v>4.25</c:v>
-                </c:pt>
-                <c:pt idx="175">
-                  <c:v>5.0</c:v>
-                </c:pt>
-                <c:pt idx="176">
-                  <c:v>3.75</c:v>
-                </c:pt>
-                <c:pt idx="177">
-                  <c:v>4.75</c:v>
-                </c:pt>
-                <c:pt idx="178">
-                  <c:v>4.5</c:v>
-                </c:pt>
-                <c:pt idx="179">
-                  <c:v>5.0</c:v>
-                </c:pt>
-                <c:pt idx="180">
-                  <c:v>4.3601190476190474</c:v>
-                </c:pt>
-                <c:pt idx="181">
-                  <c:v>4.5</c:v>
-                </c:pt>
-                <c:pt idx="182">
-                  <c:v>5.0</c:v>
-                </c:pt>
-                <c:pt idx="183">
-                  <c:v>4.5</c:v>
-                </c:pt>
-                <c:pt idx="184">
-                  <c:v>5.0</c:v>
-                </c:pt>
-                <c:pt idx="185">
-                  <c:v>4.0</c:v>
-                </c:pt>
-                <c:pt idx="186">
-                  <c:v>4.722222222222222</c:v>
-                </c:pt>
-                <c:pt idx="187">
-                  <c:v>5.0</c:v>
-                </c:pt>
-                <c:pt idx="188">
-                  <c:v>5.0</c:v>
-                </c:pt>
-                <c:pt idx="189">
-                  <c:v>4.333333333333333</c:v>
-                </c:pt>
-                <c:pt idx="190">
-                  <c:v>5.0</c:v>
-                </c:pt>
-                <c:pt idx="191">
-                  <c:v>5.0</c:v>
-                </c:pt>
-                <c:pt idx="192">
-                  <c:v>5.0</c:v>
-                </c:pt>
-                <c:pt idx="193">
-                  <c:v>4.0</c:v>
-                </c:pt>
-                <c:pt idx="194">
-                  <c:v>3.75</c:v>
-                </c:pt>
-                <c:pt idx="195">
-                  <c:v>4.5</c:v>
-                </c:pt>
-                <c:pt idx="196">
-                  <c:v>5.0</c:v>
-                </c:pt>
-                <c:pt idx="197">
-                  <c:v>4.375</c:v>
-                </c:pt>
-                <c:pt idx="198">
-                  <c:v>4.5</c:v>
-                </c:pt>
-                <c:pt idx="199">
-                  <c:v>3.0</c:v>
-                </c:pt>
-                <c:pt idx="200">
-                  <c:v>4.75</c:v>
-                </c:pt>
-                <c:pt idx="201">
-                  <c:v>4.75</c:v>
-                </c:pt>
-                <c:pt idx="202">
-                  <c:v>5.0</c:v>
-                </c:pt>
-                <c:pt idx="203">
-                  <c:v>5.0</c:v>
-                </c:pt>
-                <c:pt idx="204">
-                  <c:v>5.0</c:v>
-                </c:pt>
-                <c:pt idx="205">
-                  <c:v>4.75</c:v>
-                </c:pt>
-                <c:pt idx="206">
-                  <c:v>4.458333333333334</c:v>
-                </c:pt>
-                <c:pt idx="207">
-                  <c:v>4.451754385964912</c:v>
-                </c:pt>
-                <c:pt idx="208">
-                  <c:v>3.5</c:v>
-                </c:pt>
-                <c:pt idx="209">
-                  <c:v>5.0</c:v>
-                </c:pt>
-                <c:pt idx="210">
-                  <c:v>4.25</c:v>
-                </c:pt>
-                <c:pt idx="211">
-                  <c:v>5.0</c:v>
-                </c:pt>
-                <c:pt idx="212">
-                  <c:v>5.0</c:v>
-                </c:pt>
-                <c:pt idx="213">
-                  <c:v>4.25</c:v>
-                </c:pt>
-                <c:pt idx="214">
-                  <c:v>4.0</c:v>
-                </c:pt>
-                <c:pt idx="215">
-                  <c:v>5.0</c:v>
-                </c:pt>
-                <c:pt idx="216">
-                  <c:v>5.0</c:v>
-                </c:pt>
-                <c:pt idx="217">
-                  <c:v>5.0</c:v>
-                </c:pt>
-                <c:pt idx="218">
-                  <c:v>4.5</c:v>
-                </c:pt>
-                <c:pt idx="219">
-                  <c:v>4.0</c:v>
-                </c:pt>
-                <c:pt idx="220">
-                  <c:v>5.0</c:v>
-                </c:pt>
-                <c:pt idx="221">
-                  <c:v>4.5</c:v>
-                </c:pt>
-                <c:pt idx="222">
-                  <c:v>5.0</c:v>
-                </c:pt>
-                <c:pt idx="223">
-                  <c:v>4.75</c:v>
-                </c:pt>
-                <c:pt idx="224">
-                  <c:v>4.0</c:v>
-                </c:pt>
-                <c:pt idx="225">
-                  <c:v>5.0</c:v>
-                </c:pt>
-                <c:pt idx="226">
-                  <c:v>5.0</c:v>
-                </c:pt>
-                <c:pt idx="227">
-                  <c:v>5.0</c:v>
-                </c:pt>
-                <c:pt idx="228">
-                  <c:v>5.0</c:v>
-                </c:pt>
-                <c:pt idx="229">
-                  <c:v>5.0</c:v>
-                </c:pt>
-                <c:pt idx="230">
-                  <c:v>4.5</c:v>
-                </c:pt>
-                <c:pt idx="231">
-                  <c:v>4.25</c:v>
-                </c:pt>
-                <c:pt idx="232">
-                  <c:v>5.0</c:v>
-                </c:pt>
-                <c:pt idx="233">
-                  <c:v>4.562350119904077</c:v>
-                </c:pt>
-                <c:pt idx="234">
-                  <c:v>4.6376096491228065</c:v>
-                </c:pt>
-                <c:pt idx="235">
-                  <c:v>4.656754772393539</c:v>
-                </c:pt>
-                <c:pt idx="236">
-                  <c:v>4.533687943262412</c:v>
-                </c:pt>
-                <c:pt idx="237">
-                  <c:v>4.564912280701754</c:v>
-                </c:pt>
-                <c:pt idx="238">
-                  <c:v>4.734848484848485</c:v>
-                </c:pt>
-                <c:pt idx="239">
-                  <c:v>4.531746031746032</c:v>
-                </c:pt>
-                <c:pt idx="240">
-                  <c:v>4.408602150537635</c:v>
-                </c:pt>
-                <c:pt idx="241">
-                  <c:v>4.327272727272727</c:v>
-                </c:pt>
-                <c:pt idx="242">
-                  <c:v>4.5078347578347575</c:v>
-                </c:pt>
-                <c:pt idx="243">
-                  <c:v>4.640692640692641</c:v>
-                </c:pt>
-                <c:pt idx="244">
-                  <c:v>4.55</c:v>
-                </c:pt>
-                <c:pt idx="245">
-                  <c:v>4.672101449275362</c:v>
-                </c:pt>
-                <c:pt idx="246">
-                  <c:v>4.519005847953217</c:v>
-                </c:pt>
-                <c:pt idx="247">
-                  <c:v>4.526515151515151</c:v>
-                </c:pt>
-                <c:pt idx="248">
-                  <c:v>4.633074935400518</c:v>
-                </c:pt>
-                <c:pt idx="249">
-                  <c:v>4.277777777777779</c:v>
-                </c:pt>
-                <c:pt idx="250">
-                  <c:v>4.593175853018373</c:v>
-                </c:pt>
-                <c:pt idx="251">
-                  <c:v>4.556910569105691</c:v>
-                </c:pt>
-                <c:pt idx="252">
-                  <c:v>4.594827586206897</c:v>
-                </c:pt>
-                <c:pt idx="253">
-                  <c:v>4.595528455284553</c:v>
-                </c:pt>
-                <c:pt idx="254">
-                  <c:v>4.36864406779661</c:v>
-                </c:pt>
-                <c:pt idx="255">
-                  <c:v>4.489247311827958</c:v>
-                </c:pt>
-                <c:pt idx="256">
-                  <c:v>4.729674796747968</c:v>
-                </c:pt>
-                <c:pt idx="257">
-                  <c:v>4.593621399176954</c:v>
-                </c:pt>
-                <c:pt idx="258">
-                  <c:v>4.4818181818181815</c:v>
-                </c:pt>
-                <c:pt idx="259">
-                  <c:v>4.431578947368421</c:v>
-                </c:pt>
-                <c:pt idx="260">
-                  <c:v>4.452083333333333</c:v>
-                </c:pt>
-                <c:pt idx="261">
-                  <c:v>4.537777777777778</c:v>
-                </c:pt>
-                <c:pt idx="262">
-                  <c:v>4.5</c:v>
-                </c:pt>
-                <c:pt idx="263">
-                  <c:v>4.5519480519480515</c:v>
-                </c:pt>
-                <c:pt idx="264">
-                  <c:v>4.535714285714286</c:v>
+                  <c:v>4.262723591974861</c:v>
                 </c:pt>
               </c:numCache>
             </c:numRef>
           </c:xVal>
           <c:yVal>
             <c:numRef>
-              <c:f>Sheet1!$B$2:$B$266</c:f>
+              <c:f>Sheet1!$B$2:$B$49</c:f>
               <c:numCache>
                 <c:formatCode>General</c:formatCode>
-                <c:ptCount val="265"/>
+                <c:ptCount val="48"/>
                 <c:pt idx="0">
-                  <c:v>4.260504201680672</c:v>
+                  <c:v>3.8302083333333337</c:v>
                 </c:pt>
                 <c:pt idx="1">
-                  <c:v>4.375</c:v>
+                  <c:v>3.962929835022858</c:v>
                 </c:pt>
                 <c:pt idx="2">
-                  <c:v>5.0</c:v>
+                  <c:v>4.21790860826697</c:v>
                 </c:pt>
                 <c:pt idx="3">
-                  <c:v>4.0</c:v>
+                  <c:v>4.1444193061840116</c:v>
                 </c:pt>
                 <c:pt idx="4">
-                  <c:v>4.25</c:v>
+                  <c:v>4.443917410714286</c:v>
                 </c:pt>
                 <c:pt idx="5">
-                  <c:v>4.0</c:v>
+                  <c:v>4.1758345086976965</c:v>
                 </c:pt>
                 <c:pt idx="6">
-                  <c:v>4.25</c:v>
+                  <c:v>3.9083604777415855</c:v>
                 </c:pt>
                 <c:pt idx="7">
-                  <c:v>3.9</c:v>
+                  <c:v>3.925219667227519</c:v>
                 </c:pt>
                 <c:pt idx="8">
-                  <c:v>4.0</c:v>
+                  <c:v>4.025611175785797</c:v>
                 </c:pt>
                 <c:pt idx="9">
-                  <c:v>4.75</c:v>
+                  <c:v>4.384237421383648</c:v>
                 </c:pt>
                 <c:pt idx="10">
-                  <c:v>4.6</c:v>
+                  <c:v>3.7928966789667897</c:v>
                 </c:pt>
                 <c:pt idx="11">
-                  <c:v>4.25</c:v>
+                  <c:v>3.9571398260131554</c:v>
                 </c:pt>
                 <c:pt idx="12">
-                  <c:v>4.307795698924731</c:v>
+                  <c:v>3.702424242424243</c:v>
                 </c:pt>
                 <c:pt idx="13">
-                  <c:v>4.203980099502487</c:v>
+                  <c:v>3.8534401508011307</c:v>
                 </c:pt>
                 <c:pt idx="14">
-                  <c:v>5.0</c:v>
+                  <c:v>4.132208157524613</c:v>
                 </c:pt>
                 <c:pt idx="15">
-                  <c:v>5.0</c:v>
+                  <c:v>4.080309139784946</c:v>
                 </c:pt>
                 <c:pt idx="16">
-                  <c:v>4.0</c:v>
+                  <c:v>4.243589743589744</c:v>
                 </c:pt>
                 <c:pt idx="17">
-                  <c:v>4.447916666666667</c:v>
+                  <c:v>3.965869218500797</c:v>
                 </c:pt>
                 <c:pt idx="18">
-                  <c:v>4.642857142857143</c:v>
+                  <c:v>4.004742547425474</c:v>
                 </c:pt>
                 <c:pt idx="19">
-                  <c:v>5.0</c:v>
+                  <c:v>3.9515441959531414</c:v>
                 </c:pt>
                 <c:pt idx="20">
-                  <c:v>4.392857142857143</c:v>
+                  <c:v>4.249242424242424</c:v>
                 </c:pt>
                 <c:pt idx="21">
-                  <c:v>4.412162162162162</c:v>
+                  <c:v>4.056578380706288</c:v>
                 </c:pt>
                 <c:pt idx="22">
-                  <c:v>4.125</c:v>
+                  <c:v>3.860989278752437</c:v>
                 </c:pt>
                 <c:pt idx="23">
-                  <c:v>5.0</c:v>
+                  <c:v>3.8616557734204795</c:v>
                 </c:pt>
                 <c:pt idx="24">
-                  <c:v>4.5</c:v>
+                  <c:v>3.903453689167975</c:v>
                 </c:pt>
                 <c:pt idx="25">
-                  <c:v>4.416666666666667</c:v>
+                  <c:v>3.6888990638990635</c:v>
                 </c:pt>
                 <c:pt idx="26">
-                  <c:v>3.75</c:v>
+                  <c:v>3.6685941601049867</c:v>
                 </c:pt>
                 <c:pt idx="27">
-                  <c:v>4.0</c:v>
+                  <c:v>3.821373811714198</c:v>
                 </c:pt>
                 <c:pt idx="28">
-                  <c:v>5.0</c:v>
+                  <c:v>4.199910394265233</c:v>
                 </c:pt>
                 <c:pt idx="29">
-                  <c:v>4.875</c:v>
+                  <c:v>3.8281786941580753</c:v>
                 </c:pt>
                 <c:pt idx="30">
-                  <c:v>4.416666666666667</c:v>
+                  <c:v>3.860551075268817</c:v>
                 </c:pt>
                 <c:pt idx="31">
-                  <c:v>4.25</c:v>
+                  <c:v>4.032876712328767</c:v>
                 </c:pt>
                 <c:pt idx="32">
-                  <c:v>4.5</c:v>
+                  <c:v>4.0428359571070045</c:v>
                 </c:pt>
                 <c:pt idx="33">
-                  <c:v>5.0</c:v>
+                  <c:v>4.322057205720572</c:v>
                 </c:pt>
                 <c:pt idx="34">
-                  <c:v>5.0</c:v>
+                  <c:v>4.226013847675569</c:v>
                 </c:pt>
                 <c:pt idx="35">
-                  <c:v>4.375</c:v>
+                  <c:v>3.752932551319648</c:v>
                 </c:pt>
                 <c:pt idx="36">
-                  <c:v>5.0</c:v>
+                  <c:v>3.9448581560283684</c:v>
                 </c:pt>
                 <c:pt idx="37">
-                  <c:v>4.6</c:v>
+                  <c:v>4.168187347931873</c:v>
                 </c:pt>
                 <c:pt idx="38">
-                  <c:v>5.0</c:v>
+                  <c:v>4.043889648882809</c:v>
                 </c:pt>
                 <c:pt idx="39">
-                  <c:v>4.0</c:v>
+                  <c:v>3.8818316100443133</c:v>
                 </c:pt>
                 <c:pt idx="40">
-                  <c:v>3.75</c:v>
+                  <c:v>4.07909604519774</c:v>
                 </c:pt>
                 <c:pt idx="41">
-                  <c:v>4.25</c:v>
+                  <c:v>3.8260190664036813</c:v>
                 </c:pt>
                 <c:pt idx="42">
-                  <c:v>4.25</c:v>
+                  <c:v>4.199395576131687</c:v>
                 </c:pt>
                 <c:pt idx="43">
-                  <c:v>5.0</c:v>
+                  <c:v>4.121068114958136</c:v>
                 </c:pt>
                 <c:pt idx="44">
-                  <c:v>4.166666666666667</c:v>
+                  <c:v>4.086538461538461</c:v>
                 </c:pt>
                 <c:pt idx="45">
-                  <c:v>5.0</c:v>
+                  <c:v>3.875</c:v>
                 </c:pt>
                 <c:pt idx="46">
-                  <c:v>5.0</c:v>
+                  <c:v>4.419887278582931</c:v>
                 </c:pt>
                 <c:pt idx="47">
-                  <c:v>4.421075837742504</c:v>
-                </c:pt>
-                <c:pt idx="48">
-                  <c:v>4.416666666666667</c:v>
-                </c:pt>
-                <c:pt idx="49">
-                  <c:v>3.625</c:v>
-                </c:pt>
-                <c:pt idx="50">
-                  <c:v>4.625</c:v>
-                </c:pt>
-                <c:pt idx="51">
-                  <c:v>5.0</c:v>
-                </c:pt>
-                <c:pt idx="52">
-                  <c:v>4.75</c:v>
-                </c:pt>
-                <c:pt idx="53">
-                  <c:v>5.0</c:v>
-                </c:pt>
-                <c:pt idx="54">
-                  <c:v>4.75</c:v>
-                </c:pt>
-                <c:pt idx="55">
-                  <c:v>4.75</c:v>
-                </c:pt>
-                <c:pt idx="56">
-                  <c:v>4.455555555555556</c:v>
-                </c:pt>
-                <c:pt idx="57">
-                  <c:v>2.75</c:v>
-                </c:pt>
-                <c:pt idx="58">
-                  <c:v>2.5</c:v>
-                </c:pt>
-                <c:pt idx="59">
-                  <c:v>4.625</c:v>
-                </c:pt>
-                <c:pt idx="60">
-                  <c:v>4.6</c:v>
-                </c:pt>
-                <c:pt idx="61">
-                  <c:v>5.0</c:v>
-                </c:pt>
-                <c:pt idx="62">
-                  <c:v>0.0</c:v>
-                </c:pt>
-                <c:pt idx="63">
-                  <c:v>4.875</c:v>
-                </c:pt>
-                <c:pt idx="64">
-                  <c:v>4.36734693877551</c:v>
-                </c:pt>
-                <c:pt idx="65">
-                  <c:v>4.375</c:v>
-                </c:pt>
-                <c:pt idx="66">
-                  <c:v>4.342105263157895</c:v>
-                </c:pt>
-                <c:pt idx="67">
-                  <c:v>2.5</c:v>
-                </c:pt>
-                <c:pt idx="68">
-                  <c:v>4.25</c:v>
-                </c:pt>
-                <c:pt idx="69">
-                  <c:v>4.5</c:v>
-                </c:pt>
-                <c:pt idx="70">
-                  <c:v>4.0</c:v>
-                </c:pt>
-                <c:pt idx="71">
-                  <c:v>5.0</c:v>
-                </c:pt>
-                <c:pt idx="72">
-                  <c:v>4.34005376344086</c:v>
-                </c:pt>
-                <c:pt idx="73">
-                  <c:v>5.0</c:v>
-                </c:pt>
-                <c:pt idx="74">
-                  <c:v>2.25</c:v>
-                </c:pt>
-                <c:pt idx="75">
-                  <c:v>4.0</c:v>
-                </c:pt>
-                <c:pt idx="76">
-                  <c:v>4.546875</c:v>
-                </c:pt>
-                <c:pt idx="77">
-                  <c:v>4.355785837651123</c:v>
-                </c:pt>
-                <c:pt idx="78">
-                  <c:v>5.0</c:v>
-                </c:pt>
-                <c:pt idx="79">
-                  <c:v>4.25</c:v>
-                </c:pt>
-                <c:pt idx="80">
-                  <c:v>5.0</c:v>
-                </c:pt>
-                <c:pt idx="81">
-                  <c:v>4.0</c:v>
-                </c:pt>
-                <c:pt idx="82">
-                  <c:v>4.75</c:v>
-                </c:pt>
-                <c:pt idx="83">
-                  <c:v>4.508620689655173</c:v>
-                </c:pt>
-                <c:pt idx="84">
-                  <c:v>5.0</c:v>
-                </c:pt>
-                <c:pt idx="85">
-                  <c:v>5.0</c:v>
-                </c:pt>
-                <c:pt idx="86">
-                  <c:v>4.75</c:v>
-                </c:pt>
-                <c:pt idx="87">
-                  <c:v>4.0</c:v>
-                </c:pt>
-                <c:pt idx="88">
-                  <c:v>5.0</c:v>
-                </c:pt>
-                <c:pt idx="89">
-                  <c:v>0.0</c:v>
-                </c:pt>
-                <c:pt idx="90">
-                  <c:v>5.0</c:v>
-                </c:pt>
-                <c:pt idx="91">
-                  <c:v>2.75</c:v>
-                </c:pt>
-                <c:pt idx="92">
-                  <c:v>3.75</c:v>
-                </c:pt>
-                <c:pt idx="93">
-                  <c:v>5.0</c:v>
-                </c:pt>
-                <c:pt idx="94">
-                  <c:v>5.0</c:v>
-                </c:pt>
-                <c:pt idx="95">
-                  <c:v>4.0</c:v>
-                </c:pt>
-                <c:pt idx="96">
-                  <c:v>3.75</c:v>
-                </c:pt>
-                <c:pt idx="97">
-                  <c:v>4.875</c:v>
-                </c:pt>
-                <c:pt idx="98">
-                  <c:v>5.0</c:v>
-                </c:pt>
-                <c:pt idx="99">
-                  <c:v>4.0</c:v>
-                </c:pt>
-                <c:pt idx="100">
-                  <c:v>3.5</c:v>
-                </c:pt>
-                <c:pt idx="101">
-                  <c:v>4.5</c:v>
-                </c:pt>
-                <c:pt idx="102">
-                  <c:v>4.375</c:v>
-                </c:pt>
-                <c:pt idx="103">
-                  <c:v>3.864583333333333</c:v>
-                </c:pt>
-                <c:pt idx="104">
-                  <c:v>4.25</c:v>
-                </c:pt>
-                <c:pt idx="105">
-                  <c:v>3.0</c:v>
-                </c:pt>
-                <c:pt idx="106">
-                  <c:v>3.375</c:v>
-                </c:pt>
-                <c:pt idx="107">
-                  <c:v>4.75</c:v>
-                </c:pt>
-                <c:pt idx="108">
-                  <c:v>3.25</c:v>
-                </c:pt>
-                <c:pt idx="109">
-                  <c:v>5.0</c:v>
-                </c:pt>
-                <c:pt idx="110">
-                  <c:v>5.0</c:v>
-                </c:pt>
-                <c:pt idx="111">
-                  <c:v>5.0</c:v>
-                </c:pt>
-                <c:pt idx="112">
-                  <c:v>5.0</c:v>
-                </c:pt>
-                <c:pt idx="113">
-                  <c:v>5.0</c:v>
-                </c:pt>
-                <c:pt idx="114">
-                  <c:v>4.5</c:v>
-                </c:pt>
-                <c:pt idx="115">
-                  <c:v>4.5</c:v>
-                </c:pt>
-                <c:pt idx="116">
-                  <c:v>4.5</c:v>
-                </c:pt>
-                <c:pt idx="117">
-                  <c:v>4.0</c:v>
-                </c:pt>
-                <c:pt idx="118">
-                  <c:v>4.25</c:v>
-                </c:pt>
-                <c:pt idx="119">
-                  <c:v>4.875</c:v>
-                </c:pt>
-                <c:pt idx="120">
-                  <c:v>4.0</c:v>
-                </c:pt>
-                <c:pt idx="121">
-                  <c:v>3.75</c:v>
-                </c:pt>
-                <c:pt idx="122">
-                  <c:v>4.75</c:v>
-                </c:pt>
-                <c:pt idx="123">
-                  <c:v>4.5</c:v>
-                </c:pt>
-                <c:pt idx="124">
-                  <c:v>4.666666666666667</c:v>
-                </c:pt>
-                <c:pt idx="125">
-                  <c:v>4.5</c:v>
-                </c:pt>
-                <c:pt idx="126">
-                  <c:v>5.0</c:v>
-                </c:pt>
-                <c:pt idx="127">
-                  <c:v>4.5</c:v>
-                </c:pt>
-                <c:pt idx="128">
-                  <c:v>4.0</c:v>
-                </c:pt>
-                <c:pt idx="129">
-                  <c:v>4.75</c:v>
-                </c:pt>
-                <c:pt idx="130">
-                  <c:v>4.0</c:v>
-                </c:pt>
-                <c:pt idx="131">
-                  <c:v>5.0</c:v>
-                </c:pt>
-                <c:pt idx="132">
-                  <c:v>5.0</c:v>
-                </c:pt>
-                <c:pt idx="133">
-                  <c:v>3.25</c:v>
-                </c:pt>
-                <c:pt idx="134">
-                  <c:v>5.0</c:v>
-                </c:pt>
-                <c:pt idx="135">
-                  <c:v>4.0</c:v>
-                </c:pt>
-                <c:pt idx="136">
-                  <c:v>5.0</c:v>
-                </c:pt>
-                <c:pt idx="137">
-                  <c:v>3.0</c:v>
-                </c:pt>
-                <c:pt idx="138">
-                  <c:v>3.75</c:v>
-                </c:pt>
-                <c:pt idx="139">
-                  <c:v>0.0</c:v>
-                </c:pt>
-                <c:pt idx="140">
-                  <c:v>5.0</c:v>
-                </c:pt>
-                <c:pt idx="141">
-                  <c:v>3.5</c:v>
-                </c:pt>
-                <c:pt idx="142">
-                  <c:v>3.0</c:v>
-                </c:pt>
-                <c:pt idx="143">
-                  <c:v>4.153225806451613</c:v>
-                </c:pt>
-                <c:pt idx="144">
-                  <c:v>5.0</c:v>
-                </c:pt>
-                <c:pt idx="145">
-                  <c:v>5.0</c:v>
-                </c:pt>
-                <c:pt idx="146">
-                  <c:v>4.25</c:v>
-                </c:pt>
-                <c:pt idx="147">
-                  <c:v>4.0</c:v>
-                </c:pt>
-                <c:pt idx="148">
-                  <c:v>5.0</c:v>
-                </c:pt>
-                <c:pt idx="149">
-                  <c:v>5.0</c:v>
-                </c:pt>
-                <c:pt idx="150">
-                  <c:v>4.347670250896057</c:v>
-                </c:pt>
-                <c:pt idx="151">
-                  <c:v>3.75</c:v>
-                </c:pt>
-                <c:pt idx="152">
-                  <c:v>4.5</c:v>
-                </c:pt>
-                <c:pt idx="153">
-                  <c:v>4.75</c:v>
-                </c:pt>
-                <c:pt idx="154">
-                  <c:v>4.75</c:v>
-                </c:pt>
-                <c:pt idx="155">
-                  <c:v>3.25</c:v>
-                </c:pt>
-                <c:pt idx="156">
-                  <c:v>5.0</c:v>
-                </c:pt>
-                <c:pt idx="157">
-                  <c:v>5.0</c:v>
-                </c:pt>
-                <c:pt idx="158">
-                  <c:v>4.275</c:v>
-                </c:pt>
-                <c:pt idx="159">
-                  <c:v>4.0</c:v>
-                </c:pt>
-                <c:pt idx="160">
-                  <c:v>5.0</c:v>
-                </c:pt>
-                <c:pt idx="161">
-                  <c:v>5.0</c:v>
-                </c:pt>
-                <c:pt idx="162">
-                  <c:v>3.375</c:v>
-                </c:pt>
-                <c:pt idx="163">
-                  <c:v>4.0</c:v>
-                </c:pt>
-                <c:pt idx="164">
-                  <c:v>5.0</c:v>
-                </c:pt>
-                <c:pt idx="165">
-                  <c:v>3.0</c:v>
-                </c:pt>
-                <c:pt idx="166">
-                  <c:v>4.75</c:v>
-                </c:pt>
-                <c:pt idx="167">
-                  <c:v>2.0</c:v>
-                </c:pt>
-                <c:pt idx="168">
-                  <c:v>5.0</c:v>
-                </c:pt>
-                <c:pt idx="169">
-                  <c:v>5.0</c:v>
-                </c:pt>
-                <c:pt idx="170">
-                  <c:v>5.0</c:v>
-                </c:pt>
-                <c:pt idx="171">
-                  <c:v>5.0</c:v>
-                </c:pt>
-                <c:pt idx="172">
-                  <c:v>5.0</c:v>
-                </c:pt>
-                <c:pt idx="173">
-                  <c:v>3.0</c:v>
-                </c:pt>
-                <c:pt idx="174">
-                  <c:v>4.0</c:v>
-                </c:pt>
-                <c:pt idx="175">
-                  <c:v>5.0</c:v>
-                </c:pt>
-                <c:pt idx="176">
-                  <c:v>4.25</c:v>
-                </c:pt>
-                <c:pt idx="177">
-                  <c:v>4.75</c:v>
-                </c:pt>
-                <c:pt idx="178">
-                  <c:v>4.5</c:v>
-                </c:pt>
-                <c:pt idx="179">
-                  <c:v>5.0</c:v>
-                </c:pt>
-                <c:pt idx="180">
-                  <c:v>4.053571428571429</c:v>
-                </c:pt>
-                <c:pt idx="181">
-                  <c:v>4.833333333333333</c:v>
-                </c:pt>
-                <c:pt idx="182">
-                  <c:v>4.0</c:v>
-                </c:pt>
-                <c:pt idx="183">
-                  <c:v>5.0</c:v>
-                </c:pt>
-                <c:pt idx="184">
-                  <c:v>5.0</c:v>
-                </c:pt>
-                <c:pt idx="185">
-                  <c:v>5.0</c:v>
-                </c:pt>
-                <c:pt idx="186">
-                  <c:v>3.75</c:v>
-                </c:pt>
-                <c:pt idx="187">
-                  <c:v>4.5</c:v>
-                </c:pt>
-                <c:pt idx="188">
-                  <c:v>4.0</c:v>
-                </c:pt>
-                <c:pt idx="189">
-                  <c:v>4.75</c:v>
-                </c:pt>
-                <c:pt idx="190">
-                  <c:v>5.0</c:v>
-                </c:pt>
-                <c:pt idx="191">
-                  <c:v>5.0</c:v>
-                </c:pt>
-                <c:pt idx="192">
-                  <c:v>3.5</c:v>
-                </c:pt>
-                <c:pt idx="193">
-                  <c:v>4.0</c:v>
-                </c:pt>
-                <c:pt idx="194">
-                  <c:v>5.0</c:v>
-                </c:pt>
-                <c:pt idx="195">
-                  <c:v>3.75</c:v>
-                </c:pt>
-                <c:pt idx="196">
-                  <c:v>4.5</c:v>
-                </c:pt>
-                <c:pt idx="197">
-                  <c:v>4.25</c:v>
-                </c:pt>
-                <c:pt idx="198">
-                  <c:v>4.75</c:v>
-                </c:pt>
-                <c:pt idx="199">
-                  <c:v>4.5</c:v>
-                </c:pt>
-                <c:pt idx="200">
-                  <c:v>4.75</c:v>
-                </c:pt>
-                <c:pt idx="201">
-                  <c:v>3.75</c:v>
-                </c:pt>
-                <c:pt idx="202">
-                  <c:v>5.0</c:v>
-                </c:pt>
-                <c:pt idx="203">
-                  <c:v>5.0</c:v>
-                </c:pt>
-                <c:pt idx="204">
-                  <c:v>5.0</c:v>
-                </c:pt>
-                <c:pt idx="205">
-                  <c:v>4.25</c:v>
-                </c:pt>
-                <c:pt idx="206">
-                  <c:v>4.0</c:v>
-                </c:pt>
-                <c:pt idx="207">
-                  <c:v>4.4255555555555555</c:v>
-                </c:pt>
-                <c:pt idx="208">
-                  <c:v>4.75</c:v>
-                </c:pt>
-                <c:pt idx="209">
-                  <c:v>5.0</c:v>
-                </c:pt>
-                <c:pt idx="210">
-                  <c:v>3.25</c:v>
-                </c:pt>
-                <c:pt idx="211">
-                  <c:v>5.0</c:v>
-                </c:pt>
-                <c:pt idx="212">
-                  <c:v>5.0</c:v>
-                </c:pt>
-                <c:pt idx="213">
-                  <c:v>4.75</c:v>
-                </c:pt>
-                <c:pt idx="214">
-                  <c:v>4.0</c:v>
-                </c:pt>
-                <c:pt idx="215">
-                  <c:v>5.0</c:v>
-                </c:pt>
-                <c:pt idx="216">
-                  <c:v>5.0</c:v>
-                </c:pt>
-                <c:pt idx="217">
-                  <c:v>5.0</c:v>
-                </c:pt>
-                <c:pt idx="218">
-                  <c:v>3.25</c:v>
-                </c:pt>
-                <c:pt idx="219">
-                  <c:v>4.75</c:v>
-                </c:pt>
-                <c:pt idx="220">
-                  <c:v>5.0</c:v>
-                </c:pt>
-                <c:pt idx="221">
-                  <c:v>5.0</c:v>
-                </c:pt>
-                <c:pt idx="222">
-                  <c:v>4.75</c:v>
-                </c:pt>
-                <c:pt idx="223">
-                  <c:v>5.0</c:v>
-                </c:pt>
-                <c:pt idx="224">
-                  <c:v>3.75</c:v>
-                </c:pt>
-                <c:pt idx="225">
-                  <c:v>5.0</c:v>
-                </c:pt>
-                <c:pt idx="226">
-                  <c:v>5.0</c:v>
-                </c:pt>
-                <c:pt idx="227">
-                  <c:v>4.5</c:v>
-                </c:pt>
-                <c:pt idx="228">
-                  <c:v>5.0</c:v>
-                </c:pt>
-                <c:pt idx="229">
-                  <c:v>5.0</c:v>
-                </c:pt>
-                <c:pt idx="230">
-                  <c:v>4.25</c:v>
-                </c:pt>
-                <c:pt idx="231">
-                  <c:v>4.5</c:v>
-                </c:pt>
-                <c:pt idx="232">
-                  <c:v>5.0</c:v>
-                </c:pt>
-                <c:pt idx="233">
-                  <c:v>4.48936170212766</c:v>
-                </c:pt>
-                <c:pt idx="234">
-                  <c:v>4.645562770562771</c:v>
-                </c:pt>
-                <c:pt idx="235">
-                  <c:v>4.452433628318584</c:v>
-                </c:pt>
-                <c:pt idx="236">
-                  <c:v>4.433274021352313</c:v>
-                </c:pt>
-                <c:pt idx="237">
-                  <c:v>4.324955908289241</c:v>
-                </c:pt>
-                <c:pt idx="238">
-                  <c:v>4.177272727272728</c:v>
-                </c:pt>
-                <c:pt idx="239">
-                  <c:v>4.181818181818182</c:v>
-                </c:pt>
-                <c:pt idx="240">
-                  <c:v>4.238095238095238</c:v>
-                </c:pt>
-                <c:pt idx="241">
-                  <c:v>4.2</c:v>
-                </c:pt>
-                <c:pt idx="242">
-                  <c:v>4.157327586206897</c:v>
-                </c:pt>
-                <c:pt idx="243">
-                  <c:v>4.131578947368421</c:v>
-                </c:pt>
-                <c:pt idx="244">
-                  <c:v>4.6</c:v>
-                </c:pt>
-                <c:pt idx="245">
-                  <c:v>4.446808510638298</c:v>
-                </c:pt>
-                <c:pt idx="246">
-                  <c:v>4.3654970760233915</c:v>
-                </c:pt>
-                <c:pt idx="247">
-                  <c:v>4.401960784313726</c:v>
-                </c:pt>
-                <c:pt idx="248">
-                  <c:v>4.579396325459318</c:v>
-                </c:pt>
-                <c:pt idx="249">
-                  <c:v>4.035714285714286</c:v>
-                </c:pt>
-                <c:pt idx="250">
-                  <c:v>4.5578512396694215</c:v>
-                </c:pt>
-                <c:pt idx="251">
-                  <c:v>4.266666666666667</c:v>
-                </c:pt>
-                <c:pt idx="252">
-                  <c:v>4.241071428571429</c:v>
-                </c:pt>
-                <c:pt idx="253">
-                  <c:v>4.313008130081301</c:v>
-                </c:pt>
-                <c:pt idx="254">
-                  <c:v>4.320833333333334</c:v>
-                </c:pt>
-                <c:pt idx="255">
-                  <c:v>4.191666666666666</c:v>
-                </c:pt>
-                <c:pt idx="256">
-                  <c:v>4.55625</c:v>
-                </c:pt>
-                <c:pt idx="257">
-                  <c:v>4.390243902439025</c:v>
-                </c:pt>
-                <c:pt idx="258">
-                  <c:v>4.288690476190476</c:v>
-                </c:pt>
-                <c:pt idx="259">
-                  <c:v>4.336021505376344</c:v>
-                </c:pt>
-                <c:pt idx="260">
-                  <c:v>4.55</c:v>
-                </c:pt>
-                <c:pt idx="261">
-                  <c:v>4.279605263157895</c:v>
-                </c:pt>
-                <c:pt idx="262">
-                  <c:v>5.0</c:v>
-                </c:pt>
-                <c:pt idx="263">
-                  <c:v>4.300438596491229</c:v>
-                </c:pt>
-                <c:pt idx="264">
-                  <c:v>3.857142857142857</c:v>
+                  <c:v>4.0854810996563575</c:v>
                 </c:pt>
               </c:numCache>
             </c:numRef>
@@ -3042,41 +1740,95 @@
           </c:spPr>
           <c:cat>
             <c:strRef>
-              <c:f>Sheet1!$A$2:$A$5</c:f>
+              <c:f>Sheet1!$A$2:$A$14</c:f>
               <c:strCache>
-                <c:ptCount val="4"/>
+                <c:ptCount val="13"/>
                 <c:pt idx="0">
-                  <c:v>Literacy (English)</c:v>
+                  <c:v>I Language(à®®à¯à®¤à®²à¯ à®®à¯Šà®´à®¿à®ªà¯à®ªà®¾à®Ÿà®®à¯)</c:v>
                 </c:pt>
                 <c:pt idx="1">
-                  <c:v>Numeracy (Math)</c:v>
+                  <c:v>II Language(à®‡à®°à®£à¯à®Ÿà®¾à®®à¯ à®®à¯Šà®´à®¿à®ªà¯à®ªà®¾à®Ÿà®®à¯)</c:v>
                 </c:pt>
                 <c:pt idx="2">
-                  <c:v>General Awareness</c:v>
+                  <c:v>III Language(à®®à¯‚à®©à¯à®±à®¾à®®à¯ à®®à¯Šà®´à®¿à®ªà¯à®ªà®¾à®Ÿà®®à¯)</c:v>
                 </c:pt>
                 <c:pt idx="3">
-                  <c:v>Second Language</c:v>
+                  <c:v>Mathematics(à®•à®£à®¿à®¤à®®à¯)</c:v>
+                </c:pt>
+                <c:pt idx="4">
+                  <c:v>General Science(à®ªà¯Šà®¤à¯ à®…à®±à®¿à®µà®¿à®¯à®²à¯)</c:v>
+                </c:pt>
+                <c:pt idx="5">
+                  <c:v>Social Studies(à®šà®®à¯‚à®• à®…à®±à®¿à®µà®¿à®¯à®²à¯)</c:v>
+                </c:pt>
+                <c:pt idx="6">
+                  <c:v>Literacy ( English) Reading/writting/identification</c:v>
+                </c:pt>
+                <c:pt idx="7">
+                  <c:v>Numeracy  (Math)</c:v>
+                </c:pt>
+                <c:pt idx="8">
+                  <c:v>General awareness</c:v>
+                </c:pt>
+                <c:pt idx="9">
+                  <c:v>Second language(NA for Pre K)</c:v>
+                </c:pt>
+                <c:pt idx="10">
+                  <c:v>Physics(à®‡à®¯à®±à¯à®ªà®¿à®¯à®²à¯)</c:v>
+                </c:pt>
+                <c:pt idx="11">
+                  <c:v>Chemistry(à®µà¯‡à®¤à®¿à®¯à®¿à®¯à®²à¯)</c:v>
+                </c:pt>
+                <c:pt idx="12">
+                  <c:v>Biology(à®‰à®¯à®¿à®°à®¿à®¯à®²à¯)</c:v>
                 </c:pt>
               </c:strCache>
             </c:strRef>
           </c:cat>
           <c:val>
             <c:numRef>
-              <c:f>Sheet1!$B$2:$B$5</c:f>
+              <c:f>Sheet1!$B$2:$B$14</c:f>
               <c:numCache>
                 <c:formatCode>General</c:formatCode>
-                <c:ptCount val="4"/>
+                <c:ptCount val="13"/>
                 <c:pt idx="0">
-                  <c:v>4.585776668746101</c:v>
+                  <c:v>4.398296276211135</c:v>
                 </c:pt>
                 <c:pt idx="1">
-                  <c:v>4.602683401861069</c:v>
+                  <c:v>4.2078433156661585</c:v>
                 </c:pt>
                 <c:pt idx="2">
-                  <c:v>4.549148099606815</c:v>
+                  <c:v>4.010297829379102</c:v>
                 </c:pt>
                 <c:pt idx="3">
-                  <c:v>4.2583857442348005</c:v>
+                  <c:v>4.304505649076637</c:v>
+                </c:pt>
+                <c:pt idx="4">
+                  <c:v>4.3994497145907765</c:v>
+                </c:pt>
+                <c:pt idx="5">
+                  <c:v>4.298714664715031</c:v>
+                </c:pt>
+                <c:pt idx="6">
+                  <c:v>4.578134651019147</c:v>
+                </c:pt>
+                <c:pt idx="7">
+                  <c:v>4.5898054349573885</c:v>
+                </c:pt>
+                <c:pt idx="8">
+                  <c:v>4.535575048732944</c:v>
+                </c:pt>
+                <c:pt idx="9">
+                  <c:v>4.250048383975227</c:v>
+                </c:pt>
+                <c:pt idx="10">
+                  <c:v>4.24582607804978</c:v>
+                </c:pt>
+                <c:pt idx="11">
+                  <c:v>4.278128366938587</c:v>
+                </c:pt>
+                <c:pt idx="12">
+                  <c:v>4.337516005121639</c:v>
                 </c:pt>
               </c:numCache>
             </c:numRef>
@@ -3190,16 +1942,16 @@
                 <c:formatCode>General</c:formatCode>
                 <c:ptCount val="4"/>
                 <c:pt idx="0">
-                  <c:v>4.636500107227107</c:v>
+                  <c:v>4.269529711691919</c:v>
                 </c:pt>
                 <c:pt idx="1">
-                  <c:v>4.688593717056715</c:v>
+                  <c:v>4.4125050423557886</c:v>
                 </c:pt>
                 <c:pt idx="2">
-                  <c:v>4.636473932334996</c:v>
+                  <c:v>4.33379405666897</c:v>
                 </c:pt>
                 <c:pt idx="3">
-                  <c:v>4.512071992976295</c:v>
+                  <c:v>4.1839402821415765</c:v>
                 </c:pt>
               </c:numCache>
             </c:numRef>
@@ -3303,10 +2055,10 @@
                 <c:formatCode>General</c:formatCode>
                 <c:ptCount val="2"/>
                 <c:pt idx="0">
-                  <c:v>4.651949170794745</c:v>
+                  <c:v>4.413574467218954</c:v>
                 </c:pt>
                 <c:pt idx="1">
-                  <c:v>0.3480508292052553</c:v>
+                  <c:v>0.5864255327810461</c:v>
                 </c:pt>
               </c:numCache>
             </c:numRef>
@@ -8703,7 +7455,7 @@
           <a:lstStyle/>
           <a:p>
             <a:r>
-              <a:t>• Other - 29.1%</a:t>
+              <a:t>• Other - 29.3%</a:t>
             </a:r>
           </a:p>
         </p:txBody>
@@ -8731,7 +7483,7 @@
           <a:lstStyle/>
           <a:p>
             <a:r>
-              <a:t>• Academics &amp; Activities - 25.9%</a:t>
+              <a:t>• Communication - 18.6%</a:t>
             </a:r>
           </a:p>
         </p:txBody>
@@ -8759,7 +7511,7 @@
           <a:lstStyle/>
           <a:p>
             <a:r>
-              <a:t>• Discipline &amp; Values - 14.1%</a:t>
+              <a:t>• Discipline &amp; Values - 13.7%</a:t>
             </a:r>
           </a:p>
         </p:txBody>
@@ -8787,7 +7539,7 @@
           <a:lstStyle/>
           <a:p>
             <a:r>
-              <a:t>• Events &amp; Celebrations - 11.1%</a:t>
+              <a:t>• Student Communication - 10.9%</a:t>
             </a:r>
           </a:p>
         </p:txBody>
@@ -8815,7 +7567,7 @@
           <a:lstStyle/>
           <a:p>
             <a:r>
-              <a:t>• Student Communication - 9.6%</a:t>
+              <a:t>• Events &amp; Celebrations - 10.6%</a:t>
             </a:r>
           </a:p>
         </p:txBody>
@@ -8843,7 +7595,7 @@
           <a:lstStyle/>
           <a:p>
             <a:r>
-              <a:t>• Infrastructure &amp; Facilities - 6.9%</a:t>
+              <a:t>• Academics &amp; Activities - 6.1%</a:t>
             </a:r>
           </a:p>
         </p:txBody>
@@ -8871,7 +7623,7 @@
           <a:lstStyle/>
           <a:p>
             <a:r>
-              <a:t>• Transport - 3.2%</a:t>
+              <a:t>• Transport - 4.9%</a:t>
             </a:r>
           </a:p>
         </p:txBody>
@@ -8884,8 +7636,8 @@
         </p:nvSpPr>
         <p:spPr>
           <a:xfrm>
-            <a:off x="4754880" y="1097280"/>
-            <a:ext cx="3840480" cy="457200"/>
+            <a:off x="914400" y="3794760"/>
+            <a:ext cx="3474720" cy="365760"/>
           </a:xfrm>
           <a:prstGeom prst="rect">
             <a:avLst/>
@@ -8898,11 +7650,8 @@
           </a:bodyPr>
           <a:lstStyle/>
           <a:p>
-            <a:pPr>
-              <a:defRPr b="1"/>
-            </a:pPr>
-            <a:r>
-              <a:t>Top Improvements (Why No)</a:t>
+            <a:r>
+              <a:t>• Sports - 4.2%</a:t>
             </a:r>
           </a:p>
         </p:txBody>
@@ -8915,8 +7664,8 @@
         </p:nvSpPr>
         <p:spPr>
           <a:xfrm>
-            <a:off x="4937760" y="1554480"/>
-            <a:ext cx="3474720" cy="365760"/>
+            <a:off x="4754880" y="1097280"/>
+            <a:ext cx="3840480" cy="457200"/>
           </a:xfrm>
           <a:prstGeom prst="rect">
             <a:avLst/>
@@ -8929,8 +7678,11 @@
           </a:bodyPr>
           <a:lstStyle/>
           <a:p>
-            <a:r>
-              <a:t>• Other - 29.0%</a:t>
+            <a:pPr>
+              <a:defRPr b="1"/>
+            </a:pPr>
+            <a:r>
+              <a:t>Top Improvements (Why No)</a:t>
             </a:r>
           </a:p>
         </p:txBody>
@@ -8943,7 +7695,7 @@
         </p:nvSpPr>
         <p:spPr>
           <a:xfrm>
-            <a:off x="4937760" y="1874519"/>
+            <a:off x="4937760" y="1554480"/>
             <a:ext cx="3474720" cy="365760"/>
           </a:xfrm>
           <a:prstGeom prst="rect">
@@ -8958,7 +7710,7 @@
           <a:lstStyle/>
           <a:p>
             <a:r>
-              <a:t>• Sports - 15.7%</a:t>
+              <a:t>• Other - 29.1%</a:t>
             </a:r>
           </a:p>
         </p:txBody>
@@ -8971,7 +7723,7 @@
         </p:nvSpPr>
         <p:spPr>
           <a:xfrm>
-            <a:off x="4937760" y="2194560"/>
+            <a:off x="4937760" y="1874519"/>
             <a:ext cx="3474720" cy="365760"/>
           </a:xfrm>
           <a:prstGeom prst="rect">
@@ -8986,7 +7738,7 @@
           <a:lstStyle/>
           <a:p>
             <a:r>
-              <a:t>• Discipline &amp; Values - 13.3%</a:t>
+              <a:t>• Communication - 16.1%</a:t>
             </a:r>
           </a:p>
         </p:txBody>
@@ -8999,7 +7751,7 @@
         </p:nvSpPr>
         <p:spPr>
           <a:xfrm>
-            <a:off x="4937760" y="2514600"/>
+            <a:off x="4937760" y="2194560"/>
             <a:ext cx="3474720" cy="365760"/>
           </a:xfrm>
           <a:prstGeom prst="rect">
@@ -9014,7 +7766,7 @@
           <a:lstStyle/>
           <a:p>
             <a:r>
-              <a:t>• Student Communication - 11.1%</a:t>
+              <a:t>• Sports - 13.9%</a:t>
             </a:r>
           </a:p>
         </p:txBody>
@@ -9027,7 +7779,7 @@
         </p:nvSpPr>
         <p:spPr>
           <a:xfrm>
-            <a:off x="4937760" y="2834640"/>
+            <a:off x="4937760" y="2514600"/>
             <a:ext cx="3474720" cy="365760"/>
           </a:xfrm>
           <a:prstGeom prst="rect">
@@ -9042,7 +7794,7 @@
           <a:lstStyle/>
           <a:p>
             <a:r>
-              <a:t>• Communication - 10.8%</a:t>
+              <a:t>• Discipline &amp; Values - 12.5%</a:t>
             </a:r>
           </a:p>
         </p:txBody>
@@ -9055,7 +7807,7 @@
         </p:nvSpPr>
         <p:spPr>
           <a:xfrm>
-            <a:off x="4937760" y="3154680"/>
+            <a:off x="4937760" y="2834640"/>
             <a:ext cx="3474720" cy="365760"/>
           </a:xfrm>
           <a:prstGeom prst="rect">
@@ -9070,7 +7822,7 @@
           <a:lstStyle/>
           <a:p>
             <a:r>
-              <a:t>• Events &amp; Celebrations - 10.3%</a:t>
+              <a:t>• Student Communication - 12.4%</a:t>
             </a:r>
           </a:p>
         </p:txBody>
@@ -9083,7 +7835,7 @@
         </p:nvSpPr>
         <p:spPr>
           <a:xfrm>
-            <a:off x="4937760" y="3474720"/>
+            <a:off x="4937760" y="3154680"/>
             <a:ext cx="3474720" cy="365760"/>
           </a:xfrm>
           <a:prstGeom prst="rect">
@@ -9098,7 +7850,7 @@
           <a:lstStyle/>
           <a:p>
             <a:r>
-              <a:t>• No Concerns - 5.1%</a:t>
+              <a:t>• Events &amp; Celebrations - 8.5%</a:t>
             </a:r>
           </a:p>
         </p:txBody>
@@ -9111,7 +7863,7 @@
         </p:nvSpPr>
         <p:spPr>
           <a:xfrm>
-            <a:off x="4937760" y="3794760"/>
+            <a:off x="4937760" y="3474720"/>
             <a:ext cx="3474720" cy="365760"/>
           </a:xfrm>
           <a:prstGeom prst="rect">
@@ -9126,14 +7878,42 @@
           <a:lstStyle/>
           <a:p>
             <a:r>
-              <a:t>• Transport - 4.6%</a:t>
-            </a:r>
-          </a:p>
-        </p:txBody>
-      </p:sp>
-      <p:sp>
-        <p:nvSpPr>
-          <p:cNvPr id="20" name="Rounded Rectangle 19">
+              <a:t>• Transport - 4.2%</a:t>
+            </a:r>
+          </a:p>
+        </p:txBody>
+      </p:sp>
+      <p:sp>
+        <p:nvSpPr>
+          <p:cNvPr id="20" name="TextBox 19"/>
+          <p:cNvSpPr txBox="1"/>
+          <p:nvPr/>
+        </p:nvSpPr>
+        <p:spPr>
+          <a:xfrm>
+            <a:off x="4937760" y="3794760"/>
+            <a:ext cx="3474720" cy="365760"/>
+          </a:xfrm>
+          <a:prstGeom prst="rect">
+            <a:avLst/>
+          </a:prstGeom>
+          <a:noFill/>
+        </p:spPr>
+        <p:txBody>
+          <a:bodyPr wrap="none">
+            <a:spAutoFit/>
+          </a:bodyPr>
+          <a:lstStyle/>
+          <a:p>
+            <a:r>
+              <a:t>• No Concerns - 3.3%</a:t>
+            </a:r>
+          </a:p>
+        </p:txBody>
+      </p:sp>
+      <p:sp>
+        <p:nvSpPr>
+          <p:cNvPr id="21" name="Rounded Rectangle 20">
             <a:hlinkClick action="ppaction://hlinksldjump" r:id="rId2"/>
           </p:cNvPr>
           <p:cNvSpPr/>
@@ -9185,7 +7965,7 @@
       </p:sp>
       <p:sp>
         <p:nvSpPr>
-          <p:cNvPr id="21" name="Rounded Rectangle 20">
+          <p:cNvPr id="22" name="Rounded Rectangle 21">
             <a:hlinkClick action="ppaction://hlinksldjump" r:id="rId3"/>
           </p:cNvPr>
           <p:cNvSpPr/>
@@ -9241,7 +8021,7 @@
       </p:sp>
       <p:sp>
         <p:nvSpPr>
-          <p:cNvPr id="22" name="Rounded Rectangle 21">
+          <p:cNvPr id="23" name="Rounded Rectangle 22">
             <a:hlinkClick action="ppaction://hlinksldjump" r:id="rId4"/>
           </p:cNvPr>
           <p:cNvSpPr/>
@@ -9297,7 +8077,7 @@
       </p:sp>
       <p:sp>
         <p:nvSpPr>
-          <p:cNvPr id="23" name="Rounded Rectangle 22">
+          <p:cNvPr id="24" name="Rounded Rectangle 23">
             <a:hlinkClick action="ppaction://hlinksldjump" r:id="rId5"/>
           </p:cNvPr>
           <p:cNvSpPr/>
@@ -9353,7 +8133,7 @@
       </p:sp>
       <p:sp>
         <p:nvSpPr>
-          <p:cNvPr id="24" name="Rounded Rectangle 23">
+          <p:cNvPr id="25" name="Rounded Rectangle 24">
             <a:hlinkClick action="ppaction://hlinksldjump" r:id="rId6"/>
           </p:cNvPr>
           <p:cNvSpPr/>
@@ -9409,7 +8189,7 @@
       </p:sp>
       <p:sp>
         <p:nvSpPr>
-          <p:cNvPr id="25" name="Rounded Rectangle 24">
+          <p:cNvPr id="26" name="Rounded Rectangle 25">
             <a:hlinkClick action="ppaction://hlinksldjump" r:id="rId7"/>
           </p:cNvPr>
           <p:cNvSpPr/>
@@ -9465,7 +8245,7 @@
       </p:sp>
       <p:sp>
         <p:nvSpPr>
-          <p:cNvPr id="26" name="Rounded Rectangle 25">
+          <p:cNvPr id="27" name="Rounded Rectangle 26">
             <a:hlinkClick action="ppaction://hlinksldjump" r:id="rId8"/>
           </p:cNvPr>
           <p:cNvSpPr/>
@@ -9521,7 +8301,7 @@
       </p:sp>
       <p:sp>
         <p:nvSpPr>
-          <p:cNvPr id="27" name="Rounded Rectangle 26">
+          <p:cNvPr id="28" name="Rounded Rectangle 27">
             <a:hlinkClick action="ppaction://hlinksldjump" r:id="rId9"/>
           </p:cNvPr>
           <p:cNvSpPr/>
@@ -9577,7 +8357,7 @@
       </p:sp>
       <p:sp>
         <p:nvSpPr>
-          <p:cNvPr id="28" name="Rounded Rectangle 27">
+          <p:cNvPr id="29" name="Rounded Rectangle 28">
             <a:hlinkClick action="ppaction://hlinksldjump" r:id="rId2"/>
           </p:cNvPr>
           <p:cNvSpPr/>
@@ -10695,7 +9475,7 @@
               </a:defRPr>
             </a:pPr>
             <a:r>
-              <a:t>5063</a:t>
+              <a:t>52541</a:t>
             </a:r>
           </a:p>
         </p:txBody>
@@ -10810,7 +9590,7 @@
               </a:defRPr>
             </a:pPr>
             <a:r>
-              <a:t>266</a:t>
+              <a:t>48</a:t>
             </a:r>
           </a:p>
         </p:txBody>
@@ -10925,7 +9705,7 @@
               </a:defRPr>
             </a:pPr>
             <a:r>
-              <a:t>4</a:t>
+              <a:t>9</a:t>
             </a:r>
           </a:p>
         </p:txBody>
@@ -11040,7 +9820,7 @@
               </a:defRPr>
             </a:pPr>
             <a:r>
-              <a:t>3</a:t>
+              <a:t>5</a:t>
             </a:r>
           </a:p>
         </p:txBody>
@@ -11299,7 +10079,7 @@
           <a:lstStyle/>
           <a:p>
             <a:r>
-              <a:t>• Other 29.1%</a:t>
+              <a:t>• Other 29.3%</a:t>
             </a:r>
           </a:p>
         </p:txBody>
@@ -11327,7 +10107,7 @@
           <a:lstStyle/>
           <a:p>
             <a:r>
-              <a:t>• Academics &amp; Activiti 25.9%</a:t>
+              <a:t>• Communication 18.6%</a:t>
             </a:r>
           </a:p>
         </p:txBody>
@@ -11355,7 +10135,7 @@
           <a:lstStyle/>
           <a:p>
             <a:r>
-              <a:t>• Discipline &amp; Values 14.1%</a:t>
+              <a:t>• Discipline &amp; Values 13.7%</a:t>
             </a:r>
           </a:p>
         </p:txBody>
@@ -11418,7 +10198,7 @@
           <a:lstStyle/>
           <a:p>
             <a:r>
-              <a:t>• Other 29.0%</a:t>
+              <a:t>• Other 29.1%</a:t>
             </a:r>
           </a:p>
         </p:txBody>
@@ -11446,7 +10226,7 @@
           <a:lstStyle/>
           <a:p>
             <a:r>
-              <a:t>• Sports 15.7%</a:t>
+              <a:t>• Communication 16.1%</a:t>
             </a:r>
           </a:p>
         </p:txBody>
@@ -11474,7 +10254,7 @@
           <a:lstStyle/>
           <a:p>
             <a:r>
-              <a:t>• Discipline &amp; Values 13.3%</a:t>
+              <a:t>• Sports 13.9%</a:t>
             </a:r>
           </a:p>
         </p:txBody>
@@ -15124,7 +13904,7 @@
               </a:defRPr>
             </a:pPr>
             <a:r>
-              <a:t>4.70/5.0</a:t>
+              <a:t>4.47/5.0</a:t>
             </a:r>
           </a:p>
         </p:txBody>
@@ -15194,7 +13974,7 @@
               </a:defRPr>
             </a:pPr>
             <a:r>
-              <a:t>4.65/5.0</a:t>
+              <a:t>4.44/5.0</a:t>
             </a:r>
           </a:p>
         </p:txBody>
@@ -15264,7 +14044,7 @@
               </a:defRPr>
             </a:pPr>
             <a:r>
-              <a:t>4.62/5.0</a:t>
+              <a:t>4.39/5.0</a:t>
             </a:r>
           </a:p>
         </p:txBody>
@@ -15334,7 +14114,7 @@
               </a:defRPr>
             </a:pPr>
             <a:r>
-              <a:t>4.57/5.0</a:t>
+              <a:t>4.33/5.0</a:t>
             </a:r>
           </a:p>
         </p:txBody>

</xml_diff>

<commit_message>
updated class and orientation
</commit_message>
<xml_diff>
--- a/Pre_Primary_Feedback_Analysis.pptx
+++ b/Pre_Primary_Feedback_Analysis.pptx
@@ -861,10 +861,10 @@
                   <c:v>Valasaravakkam</c:v>
                 </c:pt>
                 <c:pt idx="6">
+                  <c:v>Thanjavur</c:v>
+                </c:pt>
+                <c:pt idx="7">
                   <c:v>Madurai</c:v>
-                </c:pt>
-                <c:pt idx="7">
-                  <c:v>Thanjavur</c:v>
                 </c:pt>
                 <c:pt idx="8">
                   <c:v>Tiruppur 2</c:v>
@@ -882,34 +882,34 @@
                 <c:formatCode>General</c:formatCode>
                 <c:ptCount val="10"/>
                 <c:pt idx="0">
-                  <c:v>4.593598650952997</c:v>
+                  <c:v>4.592698114545079</c:v>
                 </c:pt>
                 <c:pt idx="1">
-                  <c:v>4.571191433495361</c:v>
+                  <c:v>4.567689404358762</c:v>
                 </c:pt>
                 <c:pt idx="2">
-                  <c:v>4.550690041383702</c:v>
+                  <c:v>4.5486176987484805</c:v>
                 </c:pt>
                 <c:pt idx="3">
-                  <c:v>4.550642875853887</c:v>
+                  <c:v>4.546401322495105</c:v>
                 </c:pt>
                 <c:pt idx="4">
-                  <c:v>4.520580218960462</c:v>
+                  <c:v>4.518775604068939</c:v>
                 </c:pt>
                 <c:pt idx="5">
-                  <c:v>4.478479232305133</c:v>
+                  <c:v>4.474387468442645</c:v>
                 </c:pt>
                 <c:pt idx="6">
-                  <c:v>4.429532929215926</c:v>
+                  <c:v>4.4234903920678015</c:v>
                 </c:pt>
                 <c:pt idx="7">
-                  <c:v>4.424231541503598</c:v>
+                  <c:v>4.423428975596622</c:v>
                 </c:pt>
                 <c:pt idx="8">
-                  <c:v>4.420640104699313</c:v>
+                  <c:v>4.418338378937039</c:v>
                 </c:pt>
                 <c:pt idx="9">
-                  <c:v>4.417793770155797</c:v>
+                  <c:v>4.413732039431787</c:v>
                 </c:pt>
               </c:numCache>
             </c:numRef>
@@ -1020,10 +1020,10 @@
                   <c:v>Valasaravakkam</c:v>
                 </c:pt>
                 <c:pt idx="6">
+                  <c:v>Thanjavur</c:v>
+                </c:pt>
+                <c:pt idx="7">
                   <c:v>Madurai</c:v>
-                </c:pt>
-                <c:pt idx="7">
-                  <c:v>Thanjavur</c:v>
                 </c:pt>
                 <c:pt idx="8">
                   <c:v>Tiruppur 2</c:v>
@@ -1041,34 +1041,34 @@
                 <c:formatCode>General</c:formatCode>
                 <c:ptCount val="10"/>
                 <c:pt idx="0">
-                  <c:v>4.593598650952997</c:v>
+                  <c:v>4.592698114545079</c:v>
                 </c:pt>
                 <c:pt idx="1">
-                  <c:v>4.571191433495361</c:v>
+                  <c:v>4.567689404358762</c:v>
                 </c:pt>
                 <c:pt idx="2">
-                  <c:v>4.550690041383702</c:v>
+                  <c:v>4.5486176987484805</c:v>
                 </c:pt>
                 <c:pt idx="3">
-                  <c:v>4.550642875853887</c:v>
+                  <c:v>4.546401322495105</c:v>
                 </c:pt>
                 <c:pt idx="4">
-                  <c:v>4.520580218960462</c:v>
+                  <c:v>4.518775604068939</c:v>
                 </c:pt>
                 <c:pt idx="5">
-                  <c:v>4.478479232305133</c:v>
+                  <c:v>4.474387468442645</c:v>
                 </c:pt>
                 <c:pt idx="6">
-                  <c:v>4.429532929215926</c:v>
+                  <c:v>4.4234903920678015</c:v>
                 </c:pt>
                 <c:pt idx="7">
-                  <c:v>4.424231541503598</c:v>
+                  <c:v>4.423428975596622</c:v>
                 </c:pt>
                 <c:pt idx="8">
-                  <c:v>4.420640104699313</c:v>
+                  <c:v>4.418338378937039</c:v>
                 </c:pt>
                 <c:pt idx="9">
-                  <c:v>4.417793770155797</c:v>
+                  <c:v>4.413732039431787</c:v>
                 </c:pt>
               </c:numCache>
             </c:numRef>
@@ -9705,7 +9705,7 @@
               </a:defRPr>
             </a:pPr>
             <a:r>
-              <a:t>9</a:t>
+              <a:t>14</a:t>
             </a:r>
           </a:p>
         </p:txBody>
@@ -9820,7 +9820,7 @@
               </a:defRPr>
             </a:pPr>
             <a:r>
-              <a:t>5</a:t>
+              <a:t>13</a:t>
             </a:r>
           </a:p>
         </p:txBody>

</xml_diff>

<commit_message>
Enhance dashboard bucket charts and branch heatmap
</commit_message>
<xml_diff>
--- a/Pre_Primary_Feedback_Analysis.pptx
+++ b/Pre_Primary_Feedback_Analysis.pptx
@@ -284,9 +284,9 @@
           </c:spPr>
           <c:cat>
             <c:strRef>
-              <c:f>Sheet1!$A$2:$A$5</c:f>
+              <c:f>Sheet1!$A$2:$A$4</c:f>
               <c:strCache>
-                <c:ptCount val="4"/>
+                <c:ptCount val="3"/>
                 <c:pt idx="0">
                   <c:v>Leadership Access</c:v>
                 </c:pt>
@@ -295,30 +295,24 @@
                 </c:pt>
                 <c:pt idx="2">
                   <c:v>App Usability</c:v>
-                </c:pt>
-                <c:pt idx="3">
-                  <c:v>Timely Updates</c:v>
                 </c:pt>
               </c:strCache>
             </c:strRef>
           </c:cat>
           <c:val>
             <c:numRef>
-              <c:f>Sheet1!$B$2:$B$5</c:f>
+              <c:f>Sheet1!$B$2:$B$4</c:f>
               <c:numCache>
                 <c:formatCode>General</c:formatCode>
-                <c:ptCount val="4"/>
+                <c:ptCount val="3"/>
                 <c:pt idx="0">
-                  <c:v>4.407635723166183</c:v>
+                  <c:v>4.469808754430797</c:v>
                 </c:pt>
                 <c:pt idx="1">
-                  <c:v>4.425470711297071</c:v>
+                  <c:v>4.477313786157776</c:v>
                 </c:pt>
                 <c:pt idx="2">
-                  <c:v>4.247917687408133</c:v>
-                </c:pt>
-                <c:pt idx="3">
-                  <c:v>4.398358356278248</c:v>
+                  <c:v>4.3062012286236095</c:v>
                 </c:pt>
               </c:numCache>
             </c:numRef>
@@ -888,13 +882,13 @@
                   <c:v>4.567689404358762</c:v>
                 </c:pt>
                 <c:pt idx="2">
-                  <c:v>4.5486176987484805</c:v>
+                  <c:v>4.548308238094193</c:v>
                 </c:pt>
                 <c:pt idx="3">
                   <c:v>4.546401322495105</c:v>
                 </c:pt>
                 <c:pt idx="4">
-                  <c:v>4.518775604068939</c:v>
+                  <c:v>4.5186960192690995</c:v>
                 </c:pt>
                 <c:pt idx="5">
                   <c:v>4.474387468442645</c:v>
@@ -903,7 +897,7 @@
                   <c:v>4.4234903920678015</c:v>
                 </c:pt>
                 <c:pt idx="7">
-                  <c:v>4.423428975596622</c:v>
+                  <c:v>4.423208073580054</c:v>
                 </c:pt>
                 <c:pt idx="8">
                   <c:v>4.418338378937039</c:v>
@@ -1047,13 +1041,13 @@
                   <c:v>4.567689404358762</c:v>
                 </c:pt>
                 <c:pt idx="2">
-                  <c:v>4.5486176987484805</c:v>
+                  <c:v>4.548308238094193</c:v>
                 </c:pt>
                 <c:pt idx="3">
                   <c:v>4.546401322495105</c:v>
                 </c:pt>
                 <c:pt idx="4">
-                  <c:v>4.518775604068939</c:v>
+                  <c:v>4.5186960192690995</c:v>
                 </c:pt>
                 <c:pt idx="5">
                   <c:v>4.474387468442645</c:v>
@@ -1062,7 +1056,7 @@
                   <c:v>4.4234903920678015</c:v>
                 </c:pt>
                 <c:pt idx="7">
-                  <c:v>4.423428975596622</c:v>
+                  <c:v>4.423208073580054</c:v>
                 </c:pt>
                 <c:pt idx="8">
                   <c:v>4.418338378937039</c:v>

</xml_diff>